<commit_message>
Fix slide and add more demo pictures
</commit_message>
<xml_diff>
--- a/docs/Gauss-Seidel.pptx
+++ b/docs/Gauss-Seidel.pptx
@@ -3688,8 +3688,9 @@
             </a:endParaRPr>
           </a:p>
           <a:p>
-            <a:r>
-              <a:rPr lang="en-US" sz="2800">
+            <a:pPr lvl="1"/>
+            <a:r>
+              <a:rPr lang="en-US" sz="2500">
                 <a:solidFill>
                   <a:schemeClr val="tx1"/>
                 </a:solidFill>
@@ -3698,8 +3699,9 @@
             </a:r>
           </a:p>
           <a:p>
-            <a:r>
-              <a:rPr lang="en-US" sz="2800">
+            <a:pPr lvl="1"/>
+            <a:r>
+              <a:rPr lang="en-US" sz="2500">
                 <a:solidFill>
                   <a:schemeClr val="tx1"/>
                 </a:solidFill>
@@ -3708,8 +3710,9 @@
             </a:r>
           </a:p>
           <a:p>
-            <a:r>
-              <a:rPr lang="en-US" sz="2800">
+            <a:pPr lvl="1"/>
+            <a:r>
+              <a:rPr lang="en-US" sz="2500">
                 <a:solidFill>
                   <a:schemeClr val="tx1"/>
                 </a:solidFill>
@@ -3778,7 +3781,7 @@
         <p:spPr>
           <a:xfrm>
             <a:off x="1873839" y="3693604"/>
-            <a:ext cx="5612811" cy="930664"/>
+            <a:ext cx="5612811" cy="878396"/>
           </a:xfrm>
           <a:prstGeom prst="rect">
             <a:avLst/>
@@ -3903,8 +3906,8 @@
           </a:p>
         </p:txBody>
       </p:sp>
-      <mc:AlternateContent xmlns:mc="http://schemas.openxmlformats.org/markup-compatibility/2006">
-        <mc:Choice xmlns:a14="http://schemas.microsoft.com/office/drawing/2010/main" Requires="a14">
+      <mc:AlternateContent xmlns:mc="http://schemas.openxmlformats.org/markup-compatibility/2006" xmlns:a14="http://schemas.microsoft.com/office/drawing/2010/main">
+        <mc:Choice Requires="a14">
           <p:sp>
             <p:nvSpPr>
               <p:cNvPr id="5" name="Chỗ dành sẵn cho Nội dung 4">
@@ -4139,7 +4142,7 @@
             </p:txBody>
           </p:sp>
         </mc:Choice>
-        <mc:Fallback>
+        <mc:Fallback xmlns="">
           <p:sp>
             <p:nvSpPr>
               <p:cNvPr id="5" name="Chỗ dành sẵn cho Nội dung 4">
@@ -4285,10 +4288,78 @@
         </p:nvSpPr>
         <p:spPr/>
         <p:txBody>
-          <a:bodyPr/>
-          <a:lstStyle/>
-          <a:p>
-            <a:endParaRPr lang="vi-VN"/>
+          <a:bodyPr>
+            <a:normAutofit/>
+          </a:bodyPr>
+          <a:lstStyle/>
+          <a:p>
+            <a:r>
+              <a:rPr lang="en-US" sz="3200"/>
+              <a:t>Áp dụng</a:t>
+            </a:r>
+            <a:r>
+              <a:rPr lang="en-US" sz="2800"/>
+              <a:t> </a:t>
+            </a:r>
+          </a:p>
+          <a:p>
+            <a:pPr lvl="1"/>
+            <a:r>
+              <a:rPr lang="en-US" sz="2400"/>
+              <a:t>Kĩ thuật red-black ordering </a:t>
+            </a:r>
+          </a:p>
+          <a:p>
+            <a:pPr lvl="1"/>
+            <a:r>
+              <a:rPr lang="en-US" sz="2400"/>
+              <a:t>Thư viện MPI </a:t>
+            </a:r>
+          </a:p>
+          <a:p>
+            <a:pPr lvl="1"/>
+            <a:r>
+              <a:rPr lang="en-US" sz="2400"/>
+              <a:t>Ngôn ngữ lập trình C++ </a:t>
+            </a:r>
+          </a:p>
+          <a:p>
+            <a:pPr marL="342900" lvl="1" indent="0">
+              <a:buNone/>
+            </a:pPr>
+            <a:r>
+              <a:rPr lang="en-US" sz="2400"/>
+              <a:t>Để cài đặt chương trình</a:t>
+            </a:r>
+          </a:p>
+          <a:p>
+            <a:pPr marL="342900" lvl="1" indent="0">
+              <a:buNone/>
+            </a:pPr>
+            <a:endParaRPr lang="en-US" sz="2400"/>
+          </a:p>
+          <a:p>
+            <a:pPr lvl="1"/>
+            <a:r>
+              <a:rPr lang="en-US" sz="2400"/>
+              <a:t>Ngôn ngữ lập trình Python</a:t>
+            </a:r>
+          </a:p>
+          <a:p>
+            <a:pPr lvl="1"/>
+            <a:r>
+              <a:rPr lang="en-US" sz="2400"/>
+              <a:t>Thư viện matplotlib</a:t>
+            </a:r>
+          </a:p>
+          <a:p>
+            <a:pPr marL="342900" lvl="1" indent="0">
+              <a:buNone/>
+            </a:pPr>
+            <a:r>
+              <a:rPr lang="en-US" sz="2400"/>
+              <a:t>Để demo chương trình</a:t>
+            </a:r>
           </a:p>
         </p:txBody>
       </p:sp>
@@ -4600,10 +4671,10 @@
       </p:sp>
       <p:pic>
         <p:nvPicPr>
-          <p:cNvPr id="15" name="Chỗ dành sẵn cho Nội dung 14">
+          <p:cNvPr id="8" name="Chỗ dành sẵn cho Nội dung 7">
             <a:extLst>
               <a:ext uri="{FF2B5EF4-FFF2-40B4-BE49-F238E27FC236}">
-                <a16:creationId xmlns:a16="http://schemas.microsoft.com/office/drawing/2014/main" id="{C8D07AEA-F0D9-4B83-8805-E6E36C19C11A}"/>
+                <a16:creationId xmlns:a16="http://schemas.microsoft.com/office/drawing/2014/main" id="{4A348996-5564-48CD-A509-0AF503EA2117}"/>
               </a:ext>
             </a:extLst>
           </p:cNvPr>
@@ -4614,7 +4685,7 @@
             <p:ph idx="1"/>
           </p:nvPr>
         </p:nvPicPr>
-        <p:blipFill rotWithShape="1">
+        <p:blipFill>
           <a:blip r:embed="rId2">
             <a:extLst>
               <a:ext uri="{28A0092B-C50C-407E-A947-70E740481C1C}">
@@ -4622,13 +4693,14 @@
               </a:ext>
             </a:extLst>
           </a:blip>
-          <a:srcRect l="16377" t="9652" r="13594" b="1891"/>
-          <a:stretch/>
+          <a:stretch>
+            <a:fillRect/>
+          </a:stretch>
         </p:blipFill>
         <p:spPr>
           <a:xfrm>
-            <a:off x="1694467" y="1798685"/>
-            <a:ext cx="5755065" cy="4822095"/>
+            <a:off x="876874" y="1647858"/>
+            <a:ext cx="7390251" cy="4902200"/>
           </a:xfrm>
         </p:spPr>
       </p:pic>
@@ -4904,7 +4976,7 @@
                   <a:schemeClr val="tx1"/>
                 </a:solidFill>
               </a:rPr>
-              <a:t>Trạng thái kết thúc (sau khi khuếch tán)</a:t>
+              <a:t>Trạng thái ổn định</a:t>
             </a:r>
           </a:p>
         </p:txBody>
@@ -4940,10 +5012,10 @@
       </p:sp>
       <p:pic>
         <p:nvPicPr>
-          <p:cNvPr id="15" name="Chỗ dành sẵn cho Nội dung 14">
+          <p:cNvPr id="8" name="Chỗ dành sẵn cho Nội dung 7">
             <a:extLst>
               <a:ext uri="{FF2B5EF4-FFF2-40B4-BE49-F238E27FC236}">
-                <a16:creationId xmlns:a16="http://schemas.microsoft.com/office/drawing/2014/main" id="{E4B76DE8-2101-4238-A61B-F5720527B24D}"/>
+                <a16:creationId xmlns:a16="http://schemas.microsoft.com/office/drawing/2014/main" id="{0B65CA60-F63E-41DE-A1D9-D18D10A82701}"/>
               </a:ext>
             </a:extLst>
           </p:cNvPr>
@@ -4954,7 +5026,7 @@
             <p:ph idx="1"/>
           </p:nvPr>
         </p:nvPicPr>
-        <p:blipFill rotWithShape="1">
+        <p:blipFill>
           <a:blip r:embed="rId2">
             <a:extLst>
               <a:ext uri="{28A0092B-C50C-407E-A947-70E740481C1C}">
@@ -4962,13 +5034,14 @@
               </a:ext>
             </a:extLst>
           </a:blip>
-          <a:srcRect l="16760" t="10037" r="14105" b="2276"/>
-          <a:stretch/>
+          <a:stretch>
+            <a:fillRect/>
+          </a:stretch>
         </p:blipFill>
         <p:spPr>
           <a:xfrm>
-            <a:off x="1742724" y="1778213"/>
-            <a:ext cx="5658551" cy="4760700"/>
+            <a:off x="876874" y="1647858"/>
+            <a:ext cx="7390251" cy="4902200"/>
           </a:xfrm>
         </p:spPr>
       </p:pic>
@@ -5057,6 +5130,50 @@
           <a:bodyPr/>
           <a:lstStyle/>
           <a:p>
+            <a:r>
+              <a:rPr lang="en-US">
+                <a:solidFill>
+                  <a:schemeClr val="tx1"/>
+                </a:solidFill>
+              </a:rPr>
+              <a:t>Kết quả được lưu trong file “out.txt” và được thể hiện trên đồ thị trên</a:t>
+            </a:r>
+          </a:p>
+          <a:p>
+            <a:r>
+              <a:rPr lang="en-US">
+                <a:solidFill>
+                  <a:schemeClr val="tx1"/>
+                </a:solidFill>
+              </a:rPr>
+              <a:t>File “out.txt” lưu trữ ma trận các giá trị số thực</a:t>
+            </a:r>
+          </a:p>
+          <a:p>
+            <a:r>
+              <a:rPr lang="en-US">
+                <a:solidFill>
+                  <a:schemeClr val="tx1"/>
+                </a:solidFill>
+              </a:rPr>
+              <a:t>Giá trị đó là nồng độ tại vị trí t</a:t>
+            </a:r>
+            <a:r>
+              <a:rPr lang="vi-VN">
+                <a:solidFill>
+                  <a:schemeClr val="tx1"/>
+                </a:solidFill>
+              </a:rPr>
+              <a:t>ư</a:t>
+            </a:r>
+            <a:r>
+              <a:rPr lang="en-US">
+                <a:solidFill>
+                  <a:schemeClr val="tx1"/>
+                </a:solidFill>
+              </a:rPr>
+              <a:t>ơng ứng</a:t>
+            </a:r>
             <a:endParaRPr lang="vi-VN">
               <a:solidFill>
                 <a:schemeClr val="tx1"/>

</xml_diff>

<commit_message>
Fix some files and videos
</commit_message>
<xml_diff>
--- a/docs/Gauss-Seidel.pptx
+++ b/docs/Gauss-Seidel.pptx
@@ -5,17 +5,20 @@
     <p:sldMasterId id="2147483648" r:id="rId1"/>
   </p:sldMasterIdLst>
   <p:notesMasterIdLst>
-    <p:notesMasterId r:id="rId10"/>
+    <p:notesMasterId r:id="rId13"/>
   </p:notesMasterIdLst>
   <p:sldIdLst>
     <p:sldId id="256" r:id="rId2"/>
-    <p:sldId id="257" r:id="rId3"/>
+    <p:sldId id="372" r:id="rId3"/>
     <p:sldId id="321" r:id="rId4"/>
     <p:sldId id="320" r:id="rId5"/>
-    <p:sldId id="324" r:id="rId6"/>
-    <p:sldId id="370" r:id="rId7"/>
-    <p:sldId id="350" r:id="rId8"/>
-    <p:sldId id="258" r:id="rId9"/>
+    <p:sldId id="371" r:id="rId6"/>
+    <p:sldId id="373" r:id="rId7"/>
+    <p:sldId id="374" r:id="rId8"/>
+    <p:sldId id="324" r:id="rId9"/>
+    <p:sldId id="370" r:id="rId10"/>
+    <p:sldId id="350" r:id="rId11"/>
+    <p:sldId id="258" r:id="rId12"/>
   </p:sldIdLst>
   <p:sldSz cx="9144000" cy="6858000" type="screen4x3"/>
   <p:notesSz cx="6858000" cy="9144000"/>
@@ -203,7 +206,7 @@
           </a:lstStyle>
           <a:p>
             <a:fld id="{A6007B86-6B61-0B43-B5A8-02CAEE845D8E}" type="datetimeFigureOut">
-              <a:t>06/05/2019</a:t>
+              <a:t>13/05/2019</a:t>
             </a:fld>
             <a:endParaRPr lang="en-US"/>
           </a:p>
@@ -652,7 +655,7 @@
           <a:p>
             <a:fld id="{973B013D-F47D-4106-91E3-C956F0694FFC}" type="datetime1">
               <a:rPr lang="en-US" smtClean="0"/>
-              <a:t>5/6/2019</a:t>
+              <a:t>5/13/2019</a:t>
             </a:fld>
             <a:endParaRPr lang="en-US"/>
           </a:p>
@@ -820,7 +823,7 @@
           <a:p>
             <a:fld id="{8B192953-2D80-4882-910B-E84245F3A458}" type="datetime1">
               <a:rPr lang="en-US" smtClean="0"/>
-              <a:t>5/6/2019</a:t>
+              <a:t>5/13/2019</a:t>
             </a:fld>
             <a:endParaRPr lang="en-US"/>
           </a:p>
@@ -998,7 +1001,7 @@
           <a:p>
             <a:fld id="{59CF91A5-9E79-45C9-955D-077ACBE900BF}" type="datetime1">
               <a:rPr lang="en-US" smtClean="0"/>
-              <a:t>5/6/2019</a:t>
+              <a:t>5/13/2019</a:t>
             </a:fld>
             <a:endParaRPr lang="en-US"/>
           </a:p>
@@ -1166,7 +1169,7 @@
           <a:p>
             <a:fld id="{5CE2EC8A-3E55-49B4-A618-6D22C9FCAC31}" type="datetime1">
               <a:rPr lang="en-US" smtClean="0"/>
-              <a:t>5/6/2019</a:t>
+              <a:t>5/13/2019</a:t>
             </a:fld>
             <a:endParaRPr lang="en-US"/>
           </a:p>
@@ -1411,7 +1414,7 @@
           <a:p>
             <a:fld id="{D7ACE4B2-7FB4-48F1-A8EE-26199E1ADC50}" type="datetime1">
               <a:rPr lang="en-US" smtClean="0"/>
-              <a:t>5/6/2019</a:t>
+              <a:t>5/13/2019</a:t>
             </a:fld>
             <a:endParaRPr lang="en-US"/>
           </a:p>
@@ -1640,7 +1643,7 @@
           <a:p>
             <a:fld id="{C49656E2-00C4-4134-8D2E-E0439B040F8B}" type="datetime1">
               <a:rPr lang="en-US" smtClean="0"/>
-              <a:t>5/6/2019</a:t>
+              <a:t>5/13/2019</a:t>
             </a:fld>
             <a:endParaRPr lang="en-US"/>
           </a:p>
@@ -2004,7 +2007,7 @@
           <a:p>
             <a:fld id="{A52D2799-BA9D-4C7E-BCB6-8F791A67CDF7}" type="datetime1">
               <a:rPr lang="en-US" smtClean="0"/>
-              <a:t>5/6/2019</a:t>
+              <a:t>5/13/2019</a:t>
             </a:fld>
             <a:endParaRPr lang="en-US"/>
           </a:p>
@@ -2113,7 +2116,7 @@
           <a:p>
             <a:fld id="{6DC00F8D-B8BA-47F7-B4B8-753A206736B2}" type="datetime1">
               <a:rPr lang="en-US" smtClean="0"/>
-              <a:t>5/6/2019</a:t>
+              <a:t>5/13/2019</a:t>
             </a:fld>
             <a:endParaRPr lang="en-US"/>
           </a:p>
@@ -2222,7 +2225,7 @@
           <a:p>
             <a:fld id="{8947B836-980C-4925-916D-F205A7EDA82D}" type="datetime1">
               <a:rPr lang="en-US" smtClean="0"/>
-              <a:t>5/6/2019</a:t>
+              <a:t>5/13/2019</a:t>
             </a:fld>
             <a:endParaRPr lang="en-US"/>
           </a:p>
@@ -2497,7 +2500,7 @@
           <a:p>
             <a:fld id="{E7246073-17B8-46C2-A127-6EE6F96531FA}" type="datetime1">
               <a:rPr lang="en-US" smtClean="0"/>
-              <a:t>5/6/2019</a:t>
+              <a:t>5/13/2019</a:t>
             </a:fld>
             <a:endParaRPr lang="en-US"/>
           </a:p>
@@ -2752,7 +2755,7 @@
           <a:p>
             <a:fld id="{A701AA66-54DC-41F4-84CD-754C189D237E}" type="datetime1">
               <a:rPr lang="en-US" smtClean="0"/>
-              <a:t>5/6/2019</a:t>
+              <a:t>5/13/2019</a:t>
             </a:fld>
             <a:endParaRPr lang="en-US"/>
           </a:p>
@@ -2972,7 +2975,7 @@
           <a:p>
             <a:fld id="{8A59E87F-B29F-49CE-B799-1B9E7DB40948}" type="datetime1">
               <a:rPr lang="en-US" smtClean="0"/>
-              <a:t>5/6/2019</a:t>
+              <a:t>5/13/2019</a:t>
             </a:fld>
             <a:endParaRPr lang="en-US"/>
           </a:p>
@@ -3504,6 +3507,306 @@
 </p:sld>
 </file>
 
+<file path=ppt/slides/slide10.xml><?xml version="1.0" encoding="utf-8"?>
+<p:sld xmlns:a="http://schemas.openxmlformats.org/drawingml/2006/main" xmlns:r="http://schemas.openxmlformats.org/officeDocument/2006/relationships" xmlns:p="http://schemas.openxmlformats.org/presentationml/2006/main">
+  <p:cSld>
+    <p:spTree>
+      <p:nvGrpSpPr>
+        <p:cNvPr id="1" name=""/>
+        <p:cNvGrpSpPr/>
+        <p:nvPr/>
+      </p:nvGrpSpPr>
+      <p:grpSpPr>
+        <a:xfrm>
+          <a:off x="0" y="0"/>
+          <a:ext cx="0" cy="0"/>
+          <a:chOff x="0" y="0"/>
+          <a:chExt cx="0" cy="0"/>
+        </a:xfrm>
+      </p:grpSpPr>
+      <p:sp>
+        <p:nvSpPr>
+          <p:cNvPr id="2" name="Title 1">
+            <a:extLst>
+              <a:ext uri="{FF2B5EF4-FFF2-40B4-BE49-F238E27FC236}">
+                <a16:creationId xmlns:a16="http://schemas.microsoft.com/office/drawing/2014/main" id="{3E282A11-A0C2-4CBC-BB96-04B75B9F3EEE}"/>
+              </a:ext>
+            </a:extLst>
+          </p:cNvPr>
+          <p:cNvSpPr>
+            <a:spLocks noGrp="1"/>
+          </p:cNvSpPr>
+          <p:nvPr>
+            <p:ph type="title"/>
+          </p:nvPr>
+        </p:nvSpPr>
+        <p:spPr/>
+        <p:txBody>
+          <a:bodyPr/>
+          <a:lstStyle/>
+          <a:p>
+            <a:r>
+              <a:rPr lang="en-US"/>
+              <a:t>Kết quả</a:t>
+            </a:r>
+            <a:endParaRPr lang="en-US" dirty="0"/>
+          </a:p>
+        </p:txBody>
+      </p:sp>
+      <p:sp>
+        <p:nvSpPr>
+          <p:cNvPr id="4" name="Chỗ dành sẵn cho Nội dung 3">
+            <a:extLst>
+              <a:ext uri="{FF2B5EF4-FFF2-40B4-BE49-F238E27FC236}">
+                <a16:creationId xmlns:a16="http://schemas.microsoft.com/office/drawing/2014/main" id="{923DE44C-E2FD-434A-BA6E-DE8B1A389F2A}"/>
+              </a:ext>
+            </a:extLst>
+          </p:cNvPr>
+          <p:cNvSpPr>
+            <a:spLocks noGrp="1"/>
+          </p:cNvSpPr>
+          <p:nvPr>
+            <p:ph idx="1"/>
+          </p:nvPr>
+        </p:nvSpPr>
+        <p:spPr>
+          <a:xfrm>
+            <a:off x="488950" y="1647858"/>
+            <a:ext cx="8026400" cy="4600541"/>
+          </a:xfrm>
+        </p:spPr>
+        <p:txBody>
+          <a:bodyPr/>
+          <a:lstStyle/>
+          <a:p>
+            <a:r>
+              <a:rPr lang="en-US">
+                <a:solidFill>
+                  <a:schemeClr val="tx1"/>
+                </a:solidFill>
+              </a:rPr>
+              <a:t>Kết quả được lưu trong file “out.txt” và được thể hiện trên đồ thị trên</a:t>
+            </a:r>
+          </a:p>
+          <a:p>
+            <a:r>
+              <a:rPr lang="en-US">
+                <a:solidFill>
+                  <a:schemeClr val="tx1"/>
+                </a:solidFill>
+              </a:rPr>
+              <a:t>File “out.txt” lưu trữ ma trận các giá trị số thực</a:t>
+            </a:r>
+          </a:p>
+          <a:p>
+            <a:r>
+              <a:rPr lang="en-US">
+                <a:solidFill>
+                  <a:schemeClr val="tx1"/>
+                </a:solidFill>
+              </a:rPr>
+              <a:t>Giá trị đó là nồng độ tại vị trí t</a:t>
+            </a:r>
+            <a:r>
+              <a:rPr lang="vi-VN">
+                <a:solidFill>
+                  <a:schemeClr val="tx1"/>
+                </a:solidFill>
+              </a:rPr>
+              <a:t>ư</a:t>
+            </a:r>
+            <a:r>
+              <a:rPr lang="en-US">
+                <a:solidFill>
+                  <a:schemeClr val="tx1"/>
+                </a:solidFill>
+              </a:rPr>
+              <a:t>ơng ứng</a:t>
+            </a:r>
+            <a:endParaRPr lang="vi-VN">
+              <a:solidFill>
+                <a:schemeClr val="tx1"/>
+              </a:solidFill>
+            </a:endParaRPr>
+          </a:p>
+        </p:txBody>
+      </p:sp>
+      <p:sp>
+        <p:nvSpPr>
+          <p:cNvPr id="3" name="Chỗ dành sẵn cho Số hiệu Bản chiếu 2">
+            <a:extLst>
+              <a:ext uri="{FF2B5EF4-FFF2-40B4-BE49-F238E27FC236}">
+                <a16:creationId xmlns:a16="http://schemas.microsoft.com/office/drawing/2014/main" id="{135C1BB5-B8C5-47D3-A2E3-504F956FA4B2}"/>
+              </a:ext>
+            </a:extLst>
+          </p:cNvPr>
+          <p:cNvSpPr>
+            <a:spLocks noGrp="1"/>
+          </p:cNvSpPr>
+          <p:nvPr>
+            <p:ph type="sldNum" sz="quarter" idx="12"/>
+          </p:nvPr>
+        </p:nvSpPr>
+        <p:spPr/>
+        <p:txBody>
+          <a:bodyPr/>
+          <a:lstStyle/>
+          <a:p>
+            <a:fld id="{A02EBBDA-6239-48A4-BF42-145536EAE284}" type="slidenum">
+              <a:rPr lang="en-US" smtClean="0"/>
+              <a:t>10</a:t>
+            </a:fld>
+            <a:endParaRPr lang="en-US"/>
+          </a:p>
+        </p:txBody>
+      </p:sp>
+    </p:spTree>
+    <p:extLst>
+      <p:ext uri="{BB962C8B-B14F-4D97-AF65-F5344CB8AC3E}">
+        <p14:creationId xmlns:p14="http://schemas.microsoft.com/office/powerpoint/2010/main" val="96374730"/>
+      </p:ext>
+    </p:extLst>
+  </p:cSld>
+  <p:clrMapOvr>
+    <a:masterClrMapping/>
+  </p:clrMapOvr>
+</p:sld>
+</file>
+
+<file path=ppt/slides/slide11.xml><?xml version="1.0" encoding="utf-8"?>
+<p:sld xmlns:a="http://schemas.openxmlformats.org/drawingml/2006/main" xmlns:r="http://schemas.openxmlformats.org/officeDocument/2006/relationships" xmlns:p="http://schemas.openxmlformats.org/presentationml/2006/main">
+  <p:cSld>
+    <p:spTree>
+      <p:nvGrpSpPr>
+        <p:cNvPr id="1" name=""/>
+        <p:cNvGrpSpPr/>
+        <p:nvPr/>
+      </p:nvGrpSpPr>
+      <p:grpSpPr>
+        <a:xfrm>
+          <a:off x="0" y="0"/>
+          <a:ext cx="0" cy="0"/>
+          <a:chOff x="0" y="0"/>
+          <a:chExt cx="0" cy="0"/>
+        </a:xfrm>
+      </p:grpSpPr>
+      <p:sp>
+        <p:nvSpPr>
+          <p:cNvPr id="2" name="Hình chữ nhật 1">
+            <a:extLst>
+              <a:ext uri="{FF2B5EF4-FFF2-40B4-BE49-F238E27FC236}">
+                <a16:creationId xmlns:a16="http://schemas.microsoft.com/office/drawing/2014/main" id="{9248F4B9-394E-4451-A00C-ABE41F8BE311}"/>
+              </a:ext>
+            </a:extLst>
+          </p:cNvPr>
+          <p:cNvSpPr/>
+          <p:nvPr/>
+        </p:nvSpPr>
+        <p:spPr>
+          <a:xfrm>
+            <a:off x="2969860" y="2967335"/>
+            <a:ext cx="3656771" cy="923330"/>
+          </a:xfrm>
+          <a:prstGeom prst="rect">
+            <a:avLst/>
+          </a:prstGeom>
+          <a:noFill/>
+        </p:spPr>
+        <p:txBody>
+          <a:bodyPr wrap="none" lIns="91440" tIns="45720" rIns="91440" bIns="45720">
+            <a:spAutoFit/>
+          </a:bodyPr>
+          <a:lstStyle/>
+          <a:p>
+            <a:pPr algn="ctr"/>
+            <a:r>
+              <a:rPr lang="en-US" sz="5400" b="1">
+                <a:ln w="12700">
+                  <a:solidFill>
+                    <a:schemeClr val="tx2">
+                      <a:lumMod val="75000"/>
+                    </a:schemeClr>
+                  </a:solidFill>
+                  <a:prstDash val="solid"/>
+                </a:ln>
+                <a:solidFill>
+                  <a:srgbClr val="C00000"/>
+                </a:solidFill>
+                <a:effectLst>
+                  <a:outerShdw dist="38100" dir="2640000" algn="bl" rotWithShape="0">
+                    <a:schemeClr val="tx2">
+                      <a:lumMod val="75000"/>
+                    </a:schemeClr>
+                  </a:outerShdw>
+                </a:effectLst>
+              </a:rPr>
+              <a:t>THANK YOU</a:t>
+            </a:r>
+            <a:endParaRPr lang="vi-VN" sz="5400" b="1">
+              <a:ln w="12700">
+                <a:solidFill>
+                  <a:schemeClr val="tx2">
+                    <a:lumMod val="75000"/>
+                  </a:schemeClr>
+                </a:solidFill>
+                <a:prstDash val="solid"/>
+              </a:ln>
+              <a:solidFill>
+                <a:srgbClr val="C00000"/>
+              </a:solidFill>
+              <a:effectLst>
+                <a:outerShdw dist="38100" dir="2640000" algn="bl" rotWithShape="0">
+                  <a:schemeClr val="tx2">
+                    <a:lumMod val="75000"/>
+                  </a:schemeClr>
+                </a:outerShdw>
+              </a:effectLst>
+            </a:endParaRPr>
+          </a:p>
+        </p:txBody>
+      </p:sp>
+      <p:sp>
+        <p:nvSpPr>
+          <p:cNvPr id="3" name="Chỗ dành sẵn cho Số hiệu Bản chiếu 2">
+            <a:extLst>
+              <a:ext uri="{FF2B5EF4-FFF2-40B4-BE49-F238E27FC236}">
+                <a16:creationId xmlns:a16="http://schemas.microsoft.com/office/drawing/2014/main" id="{965C8D37-3ADD-4A21-BFCC-41A0B6017781}"/>
+              </a:ext>
+            </a:extLst>
+          </p:cNvPr>
+          <p:cNvSpPr>
+            <a:spLocks noGrp="1"/>
+          </p:cNvSpPr>
+          <p:nvPr>
+            <p:ph type="sldNum" sz="quarter" idx="12"/>
+          </p:nvPr>
+        </p:nvSpPr>
+        <p:spPr/>
+        <p:txBody>
+          <a:bodyPr/>
+          <a:lstStyle/>
+          <a:p>
+            <a:fld id="{A02EBBDA-6239-48A4-BF42-145536EAE284}" type="slidenum">
+              <a:rPr lang="en-US" smtClean="0"/>
+              <a:t>11</a:t>
+            </a:fld>
+            <a:endParaRPr lang="en-US"/>
+          </a:p>
+        </p:txBody>
+      </p:sp>
+    </p:spTree>
+    <p:extLst>
+      <p:ext uri="{BB962C8B-B14F-4D97-AF65-F5344CB8AC3E}">
+        <p14:creationId xmlns:p14="http://schemas.microsoft.com/office/powerpoint/2010/main" val="3158584091"/>
+      </p:ext>
+    </p:extLst>
+  </p:cSld>
+  <p:clrMapOvr>
+    <a:masterClrMapping/>
+  </p:clrMapOvr>
+</p:sld>
+</file>
+
 <file path=ppt/slides/slide2.xml><?xml version="1.0" encoding="utf-8"?>
 <p:sld xmlns:a="http://schemas.openxmlformats.org/drawingml/2006/main" xmlns:r="http://schemas.openxmlformats.org/officeDocument/2006/relationships" xmlns:p="http://schemas.openxmlformats.org/presentationml/2006/main">
   <p:cSld>
@@ -3545,13 +3848,14 @@
               <a:t> </a:t>
             </a:r>
             <a:r>
-              <a:rPr lang="en-US" dirty="0" err="1"/>
+              <a:rPr lang="en-US" err="1"/>
               <a:t>thiệu</a:t>
             </a:r>
             <a:r>
-              <a:rPr lang="en-US" dirty="0"/>
+              <a:rPr lang="en-US"/>
               <a:t> </a:t>
             </a:r>
+            <a:endParaRPr lang="en-US" dirty="0"/>
           </a:p>
         </p:txBody>
       </p:sp>
@@ -3614,6 +3918,41 @@
                 <a:cs typeface="Calibri" panose="020F0502020204030204" pitchFamily="34" charset="0"/>
               </a:rPr>
               <a:t>ơng pháp Gauss-Seidel Iterative để giải bài toán “Time Independent Diffusion Equation”</a:t>
+            </a:r>
+          </a:p>
+          <a:p>
+            <a:pPr marL="0" indent="0">
+              <a:buNone/>
+            </a:pPr>
+            <a:r>
+              <a:rPr lang="en-US" sz="2800">
+                <a:solidFill>
+                  <a:schemeClr val="tx1"/>
+                </a:solidFill>
+                <a:latin typeface="Calibri" panose="020F0502020204030204" pitchFamily="34" charset="0"/>
+                <a:cs typeface="Calibri" panose="020F0502020204030204" pitchFamily="34" charset="0"/>
+              </a:rPr>
+              <a:t>Cụ thể ta cần giải ph</a:t>
+            </a:r>
+            <a:r>
+              <a:rPr lang="vi-VN" sz="2800">
+                <a:solidFill>
+                  <a:schemeClr val="tx1"/>
+                </a:solidFill>
+                <a:latin typeface="Calibri" panose="020F0502020204030204" pitchFamily="34" charset="0"/>
+                <a:cs typeface="Calibri" panose="020F0502020204030204" pitchFamily="34" charset="0"/>
+              </a:rPr>
+              <a:t>ư</a:t>
+            </a:r>
+            <a:r>
+              <a:rPr lang="en-US" sz="2800">
+                <a:solidFill>
+                  <a:schemeClr val="tx1"/>
+                </a:solidFill>
+                <a:latin typeface="Calibri" panose="020F0502020204030204" pitchFamily="34" charset="0"/>
+                <a:cs typeface="Calibri" panose="020F0502020204030204" pitchFamily="34" charset="0"/>
+              </a:rPr>
+              <a:t>ơng trình:</a:t>
             </a:r>
           </a:p>
           <a:p>
@@ -3632,41 +3971,6 @@
             <a:pPr marL="0" indent="0">
               <a:buNone/>
             </a:pPr>
-            <a:r>
-              <a:rPr lang="en-US" sz="2800">
-                <a:solidFill>
-                  <a:schemeClr val="tx1"/>
-                </a:solidFill>
-                <a:latin typeface="Calibri" panose="020F0502020204030204" pitchFamily="34" charset="0"/>
-                <a:cs typeface="Calibri" panose="020F0502020204030204" pitchFamily="34" charset="0"/>
-              </a:rPr>
-              <a:t>Cụ thể ta cần giải ph</a:t>
-            </a:r>
-            <a:r>
-              <a:rPr lang="vi-VN" sz="2800">
-                <a:solidFill>
-                  <a:schemeClr val="tx1"/>
-                </a:solidFill>
-                <a:latin typeface="Calibri" panose="020F0502020204030204" pitchFamily="34" charset="0"/>
-                <a:cs typeface="Calibri" panose="020F0502020204030204" pitchFamily="34" charset="0"/>
-              </a:rPr>
-              <a:t>ư</a:t>
-            </a:r>
-            <a:r>
-              <a:rPr lang="en-US" sz="2800">
-                <a:solidFill>
-                  <a:schemeClr val="tx1"/>
-                </a:solidFill>
-                <a:latin typeface="Calibri" panose="020F0502020204030204" pitchFamily="34" charset="0"/>
-                <a:cs typeface="Calibri" panose="020F0502020204030204" pitchFamily="34" charset="0"/>
-              </a:rPr>
-              <a:t>ơng trình:</a:t>
-            </a:r>
-          </a:p>
-          <a:p>
-            <a:pPr marL="0" indent="0">
-              <a:buNone/>
-            </a:pPr>
             <a:endParaRPr lang="en-US" sz="2800">
               <a:solidFill>
                 <a:schemeClr val="tx1"/>
@@ -3676,18 +3980,6 @@
             </a:endParaRPr>
           </a:p>
           <a:p>
-            <a:pPr marL="0" indent="0">
-              <a:buNone/>
-            </a:pPr>
-            <a:endParaRPr lang="en-US" sz="2800">
-              <a:solidFill>
-                <a:schemeClr val="tx1"/>
-              </a:solidFill>
-              <a:latin typeface="Calibri" panose="020F0502020204030204" pitchFamily="34" charset="0"/>
-              <a:cs typeface="Calibri" panose="020F0502020204030204" pitchFamily="34" charset="0"/>
-            </a:endParaRPr>
-          </a:p>
-          <a:p>
             <a:pPr lvl="1"/>
             <a:r>
               <a:rPr lang="en-US" sz="2500">
@@ -3717,7 +4009,7 @@
                   <a:schemeClr val="tx1"/>
                 </a:solidFill>
               </a:rPr>
-              <a:t>n là lần lặp</a:t>
+              <a:t>n là chỉ số lần lặp</a:t>
             </a:r>
           </a:p>
           <a:p>
@@ -3780,8 +4072,8 @@
         </p:blipFill>
         <p:spPr>
           <a:xfrm>
-            <a:off x="1873839" y="3693604"/>
-            <a:ext cx="5612811" cy="878396"/>
+            <a:off x="374939" y="3265631"/>
+            <a:ext cx="4907774" cy="768059"/>
           </a:xfrm>
           <a:prstGeom prst="rect">
             <a:avLst/>
@@ -3818,10 +4110,1098 @@
           </a:sp3d>
         </p:spPr>
       </p:pic>
+      <p:grpSp>
+        <p:nvGrpSpPr>
+          <p:cNvPr id="6" name="Group 58">
+            <a:extLst>
+              <a:ext uri="{FF2B5EF4-FFF2-40B4-BE49-F238E27FC236}">
+                <a16:creationId xmlns:a16="http://schemas.microsoft.com/office/drawing/2014/main" id="{2184EFC9-4B38-4DC8-836C-C1BA166AA232}"/>
+              </a:ext>
+            </a:extLst>
+          </p:cNvPr>
+          <p:cNvGrpSpPr/>
+          <p:nvPr/>
+        </p:nvGrpSpPr>
+        <p:grpSpPr>
+          <a:xfrm>
+            <a:off x="5671139" y="2967693"/>
+            <a:ext cx="3200400" cy="3571220"/>
+            <a:chOff x="5257800" y="1219200"/>
+            <a:chExt cx="3200400" cy="3571220"/>
+          </a:xfrm>
+        </p:grpSpPr>
+        <p:sp>
+          <p:nvSpPr>
+            <p:cNvPr id="7" name="Rectangle 8">
+              <a:extLst>
+                <a:ext uri="{FF2B5EF4-FFF2-40B4-BE49-F238E27FC236}">
+                  <a16:creationId xmlns:a16="http://schemas.microsoft.com/office/drawing/2014/main" id="{0B697326-18FC-42A4-A6FF-80150447E63E}"/>
+                </a:ext>
+              </a:extLst>
+            </p:cNvPr>
+            <p:cNvSpPr/>
+            <p:nvPr/>
+          </p:nvSpPr>
+          <p:spPr>
+            <a:xfrm>
+              <a:off x="5257800" y="1219200"/>
+              <a:ext cx="3200400" cy="2895600"/>
+            </a:xfrm>
+            <a:prstGeom prst="rect">
+              <a:avLst/>
+            </a:prstGeom>
+            <a:noFill/>
+          </p:spPr>
+          <p:style>
+            <a:lnRef idx="2">
+              <a:schemeClr val="accent1">
+                <a:shade val="50000"/>
+              </a:schemeClr>
+            </a:lnRef>
+            <a:fillRef idx="1">
+              <a:schemeClr val="accent1"/>
+            </a:fillRef>
+            <a:effectRef idx="0">
+              <a:schemeClr val="accent1"/>
+            </a:effectRef>
+            <a:fontRef idx="minor">
+              <a:schemeClr val="lt1"/>
+            </a:fontRef>
+          </p:style>
+          <p:txBody>
+            <a:bodyPr rtlCol="0" anchor="ctr"/>
+            <a:lstStyle/>
+            <a:p>
+              <a:pPr algn="ctr"/>
+              <a:endParaRPr lang="en-US"/>
+            </a:p>
+          </p:txBody>
+        </p:sp>
+        <p:cxnSp>
+          <p:nvCxnSpPr>
+            <p:cNvPr id="8" name="Straight Connector 10">
+              <a:extLst>
+                <a:ext uri="{FF2B5EF4-FFF2-40B4-BE49-F238E27FC236}">
+                  <a16:creationId xmlns:a16="http://schemas.microsoft.com/office/drawing/2014/main" id="{21A9DD08-61C7-4428-A878-89CC329FA67E}"/>
+                </a:ext>
+              </a:extLst>
+            </p:cNvPr>
+            <p:cNvCxnSpPr/>
+            <p:nvPr/>
+          </p:nvCxnSpPr>
+          <p:spPr>
+            <a:xfrm rot="10800000" flipH="1">
+              <a:off x="5257800" y="2667001"/>
+              <a:ext cx="3200400" cy="1588"/>
+            </a:xfrm>
+            <a:prstGeom prst="line">
+              <a:avLst/>
+            </a:prstGeom>
+          </p:spPr>
+          <p:style>
+            <a:lnRef idx="1">
+              <a:schemeClr val="accent1"/>
+            </a:lnRef>
+            <a:fillRef idx="0">
+              <a:schemeClr val="accent1"/>
+            </a:fillRef>
+            <a:effectRef idx="0">
+              <a:schemeClr val="accent1"/>
+            </a:effectRef>
+            <a:fontRef idx="minor">
+              <a:schemeClr val="tx1"/>
+            </a:fontRef>
+          </p:style>
+        </p:cxnSp>
+        <p:cxnSp>
+          <p:nvCxnSpPr>
+            <p:cNvPr id="9" name="Straight Connector 11">
+              <a:extLst>
+                <a:ext uri="{FF2B5EF4-FFF2-40B4-BE49-F238E27FC236}">
+                  <a16:creationId xmlns:a16="http://schemas.microsoft.com/office/drawing/2014/main" id="{E7B9C571-088A-43E1-AEEF-9FD65892263B}"/>
+                </a:ext>
+              </a:extLst>
+            </p:cNvPr>
+            <p:cNvCxnSpPr/>
+            <p:nvPr/>
+          </p:nvCxnSpPr>
+          <p:spPr>
+            <a:xfrm rot="10800000" flipH="1">
+              <a:off x="5257800" y="2970212"/>
+              <a:ext cx="3200400" cy="1588"/>
+            </a:xfrm>
+            <a:prstGeom prst="line">
+              <a:avLst/>
+            </a:prstGeom>
+          </p:spPr>
+          <p:style>
+            <a:lnRef idx="1">
+              <a:schemeClr val="accent1"/>
+            </a:lnRef>
+            <a:fillRef idx="0">
+              <a:schemeClr val="accent1"/>
+            </a:fillRef>
+            <a:effectRef idx="0">
+              <a:schemeClr val="accent1"/>
+            </a:effectRef>
+            <a:fontRef idx="minor">
+              <a:schemeClr val="tx1"/>
+            </a:fontRef>
+          </p:style>
+        </p:cxnSp>
+        <p:cxnSp>
+          <p:nvCxnSpPr>
+            <p:cNvPr id="10" name="Straight Connector 12">
+              <a:extLst>
+                <a:ext uri="{FF2B5EF4-FFF2-40B4-BE49-F238E27FC236}">
+                  <a16:creationId xmlns:a16="http://schemas.microsoft.com/office/drawing/2014/main" id="{AA8B33A0-3B28-4D37-AF06-70898C996497}"/>
+                </a:ext>
+              </a:extLst>
+            </p:cNvPr>
+            <p:cNvCxnSpPr/>
+            <p:nvPr/>
+          </p:nvCxnSpPr>
+          <p:spPr>
+            <a:xfrm rot="10800000" flipH="1">
+              <a:off x="5257800" y="3579812"/>
+              <a:ext cx="3200400" cy="1588"/>
+            </a:xfrm>
+            <a:prstGeom prst="line">
+              <a:avLst/>
+            </a:prstGeom>
+          </p:spPr>
+          <p:style>
+            <a:lnRef idx="1">
+              <a:schemeClr val="accent1"/>
+            </a:lnRef>
+            <a:fillRef idx="0">
+              <a:schemeClr val="accent1"/>
+            </a:fillRef>
+            <a:effectRef idx="0">
+              <a:schemeClr val="accent1"/>
+            </a:effectRef>
+            <a:fontRef idx="minor">
+              <a:schemeClr val="tx1"/>
+            </a:fontRef>
+          </p:style>
+        </p:cxnSp>
+        <p:cxnSp>
+          <p:nvCxnSpPr>
+            <p:cNvPr id="11" name="Straight Connector 13">
+              <a:extLst>
+                <a:ext uri="{FF2B5EF4-FFF2-40B4-BE49-F238E27FC236}">
+                  <a16:creationId xmlns:a16="http://schemas.microsoft.com/office/drawing/2014/main" id="{79360B7E-DB01-420C-874D-78F0F4648DB2}"/>
+                </a:ext>
+              </a:extLst>
+            </p:cNvPr>
+            <p:cNvCxnSpPr/>
+            <p:nvPr/>
+          </p:nvCxnSpPr>
+          <p:spPr>
+            <a:xfrm rot="10800000" flipH="1">
+              <a:off x="5257800" y="3275012"/>
+              <a:ext cx="3200400" cy="1588"/>
+            </a:xfrm>
+            <a:prstGeom prst="line">
+              <a:avLst/>
+            </a:prstGeom>
+          </p:spPr>
+          <p:style>
+            <a:lnRef idx="1">
+              <a:schemeClr val="accent1"/>
+            </a:lnRef>
+            <a:fillRef idx="0">
+              <a:schemeClr val="accent1"/>
+            </a:fillRef>
+            <a:effectRef idx="0">
+              <a:schemeClr val="accent1"/>
+            </a:effectRef>
+            <a:fontRef idx="minor">
+              <a:schemeClr val="tx1"/>
+            </a:fontRef>
+          </p:style>
+        </p:cxnSp>
+        <p:cxnSp>
+          <p:nvCxnSpPr>
+            <p:cNvPr id="12" name="Straight Connector 14">
+              <a:extLst>
+                <a:ext uri="{FF2B5EF4-FFF2-40B4-BE49-F238E27FC236}">
+                  <a16:creationId xmlns:a16="http://schemas.microsoft.com/office/drawing/2014/main" id="{E6405802-CBC7-4AB4-BE69-3B1EC6A7CBFA}"/>
+                </a:ext>
+              </a:extLst>
+            </p:cNvPr>
+            <p:cNvCxnSpPr/>
+            <p:nvPr/>
+          </p:nvCxnSpPr>
+          <p:spPr>
+            <a:xfrm rot="10800000" flipH="1">
+              <a:off x="5257800" y="3884612"/>
+              <a:ext cx="3200400" cy="1588"/>
+            </a:xfrm>
+            <a:prstGeom prst="line">
+              <a:avLst/>
+            </a:prstGeom>
+          </p:spPr>
+          <p:style>
+            <a:lnRef idx="1">
+              <a:schemeClr val="accent1"/>
+            </a:lnRef>
+            <a:fillRef idx="0">
+              <a:schemeClr val="accent1"/>
+            </a:fillRef>
+            <a:effectRef idx="0">
+              <a:schemeClr val="accent1"/>
+            </a:effectRef>
+            <a:fontRef idx="minor">
+              <a:schemeClr val="tx1"/>
+            </a:fontRef>
+          </p:style>
+        </p:cxnSp>
+        <p:cxnSp>
+          <p:nvCxnSpPr>
+            <p:cNvPr id="13" name="Straight Connector 15">
+              <a:extLst>
+                <a:ext uri="{FF2B5EF4-FFF2-40B4-BE49-F238E27FC236}">
+                  <a16:creationId xmlns:a16="http://schemas.microsoft.com/office/drawing/2014/main" id="{FF20870A-0CEE-45CF-A490-02ED3A89609A}"/>
+                </a:ext>
+              </a:extLst>
+            </p:cNvPr>
+            <p:cNvCxnSpPr/>
+            <p:nvPr/>
+          </p:nvCxnSpPr>
+          <p:spPr>
+            <a:xfrm rot="10800000" flipH="1">
+              <a:off x="5257800" y="1446212"/>
+              <a:ext cx="3200400" cy="1588"/>
+            </a:xfrm>
+            <a:prstGeom prst="line">
+              <a:avLst/>
+            </a:prstGeom>
+          </p:spPr>
+          <p:style>
+            <a:lnRef idx="1">
+              <a:schemeClr val="accent1"/>
+            </a:lnRef>
+            <a:fillRef idx="0">
+              <a:schemeClr val="accent1"/>
+            </a:fillRef>
+            <a:effectRef idx="0">
+              <a:schemeClr val="accent1"/>
+            </a:effectRef>
+            <a:fontRef idx="minor">
+              <a:schemeClr val="tx1"/>
+            </a:fontRef>
+          </p:style>
+        </p:cxnSp>
+        <p:cxnSp>
+          <p:nvCxnSpPr>
+            <p:cNvPr id="14" name="Straight Connector 16">
+              <a:extLst>
+                <a:ext uri="{FF2B5EF4-FFF2-40B4-BE49-F238E27FC236}">
+                  <a16:creationId xmlns:a16="http://schemas.microsoft.com/office/drawing/2014/main" id="{31397D3D-6C24-4BE3-9385-B7B775355146}"/>
+                </a:ext>
+              </a:extLst>
+            </p:cNvPr>
+            <p:cNvCxnSpPr/>
+            <p:nvPr/>
+          </p:nvCxnSpPr>
+          <p:spPr>
+            <a:xfrm rot="10800000" flipH="1">
+              <a:off x="5257800" y="2055812"/>
+              <a:ext cx="3200400" cy="1588"/>
+            </a:xfrm>
+            <a:prstGeom prst="line">
+              <a:avLst/>
+            </a:prstGeom>
+          </p:spPr>
+          <p:style>
+            <a:lnRef idx="1">
+              <a:schemeClr val="accent1"/>
+            </a:lnRef>
+            <a:fillRef idx="0">
+              <a:schemeClr val="accent1"/>
+            </a:fillRef>
+            <a:effectRef idx="0">
+              <a:schemeClr val="accent1"/>
+            </a:effectRef>
+            <a:fontRef idx="minor">
+              <a:schemeClr val="tx1"/>
+            </a:fontRef>
+          </p:style>
+        </p:cxnSp>
+        <p:cxnSp>
+          <p:nvCxnSpPr>
+            <p:cNvPr id="15" name="Straight Connector 17">
+              <a:extLst>
+                <a:ext uri="{FF2B5EF4-FFF2-40B4-BE49-F238E27FC236}">
+                  <a16:creationId xmlns:a16="http://schemas.microsoft.com/office/drawing/2014/main" id="{D8AF4C63-DF32-4E52-B07B-2BA387FCF1A1}"/>
+                </a:ext>
+              </a:extLst>
+            </p:cNvPr>
+            <p:cNvCxnSpPr/>
+            <p:nvPr/>
+          </p:nvCxnSpPr>
+          <p:spPr>
+            <a:xfrm rot="10800000" flipH="1">
+              <a:off x="5257800" y="1751012"/>
+              <a:ext cx="3200400" cy="1588"/>
+            </a:xfrm>
+            <a:prstGeom prst="line">
+              <a:avLst/>
+            </a:prstGeom>
+          </p:spPr>
+          <p:style>
+            <a:lnRef idx="1">
+              <a:schemeClr val="accent1"/>
+            </a:lnRef>
+            <a:fillRef idx="0">
+              <a:schemeClr val="accent1"/>
+            </a:fillRef>
+            <a:effectRef idx="0">
+              <a:schemeClr val="accent1"/>
+            </a:effectRef>
+            <a:fontRef idx="minor">
+              <a:schemeClr val="tx1"/>
+            </a:fontRef>
+          </p:style>
+        </p:cxnSp>
+        <p:cxnSp>
+          <p:nvCxnSpPr>
+            <p:cNvPr id="16" name="Straight Connector 18">
+              <a:extLst>
+                <a:ext uri="{FF2B5EF4-FFF2-40B4-BE49-F238E27FC236}">
+                  <a16:creationId xmlns:a16="http://schemas.microsoft.com/office/drawing/2014/main" id="{6DE30A2E-DCC3-4E92-88B5-E086A3FE9B78}"/>
+                </a:ext>
+              </a:extLst>
+            </p:cNvPr>
+            <p:cNvCxnSpPr/>
+            <p:nvPr/>
+          </p:nvCxnSpPr>
+          <p:spPr>
+            <a:xfrm rot="10800000" flipH="1">
+              <a:off x="5257800" y="2360612"/>
+              <a:ext cx="3200400" cy="1588"/>
+            </a:xfrm>
+            <a:prstGeom prst="line">
+              <a:avLst/>
+            </a:prstGeom>
+          </p:spPr>
+          <p:style>
+            <a:lnRef idx="1">
+              <a:schemeClr val="accent1"/>
+            </a:lnRef>
+            <a:fillRef idx="0">
+              <a:schemeClr val="accent1"/>
+            </a:fillRef>
+            <a:effectRef idx="0">
+              <a:schemeClr val="accent1"/>
+            </a:effectRef>
+            <a:fontRef idx="minor">
+              <a:schemeClr val="tx1"/>
+            </a:fontRef>
+          </p:style>
+        </p:cxnSp>
+        <p:cxnSp>
+          <p:nvCxnSpPr>
+            <p:cNvPr id="17" name="Straight Connector 20">
+              <a:extLst>
+                <a:ext uri="{FF2B5EF4-FFF2-40B4-BE49-F238E27FC236}">
+                  <a16:creationId xmlns:a16="http://schemas.microsoft.com/office/drawing/2014/main" id="{2BE7DEE2-0E9E-490F-B56E-84CC0B1AC2B3}"/>
+                </a:ext>
+              </a:extLst>
+            </p:cNvPr>
+            <p:cNvCxnSpPr/>
+            <p:nvPr/>
+          </p:nvCxnSpPr>
+          <p:spPr>
+            <a:xfrm rot="16200000" flipH="1">
+              <a:off x="5435928" y="2819002"/>
+              <a:ext cx="3199606" cy="1589"/>
+            </a:xfrm>
+            <a:prstGeom prst="line">
+              <a:avLst/>
+            </a:prstGeom>
+          </p:spPr>
+          <p:style>
+            <a:lnRef idx="1">
+              <a:schemeClr val="accent1"/>
+            </a:lnRef>
+            <a:fillRef idx="0">
+              <a:schemeClr val="accent1"/>
+            </a:fillRef>
+            <a:effectRef idx="0">
+              <a:schemeClr val="accent1"/>
+            </a:effectRef>
+            <a:fontRef idx="minor">
+              <a:schemeClr val="tx1"/>
+            </a:fontRef>
+          </p:style>
+        </p:cxnSp>
+        <p:cxnSp>
+          <p:nvCxnSpPr>
+            <p:cNvPr id="18" name="Straight Connector 21">
+              <a:extLst>
+                <a:ext uri="{FF2B5EF4-FFF2-40B4-BE49-F238E27FC236}">
+                  <a16:creationId xmlns:a16="http://schemas.microsoft.com/office/drawing/2014/main" id="{5D0D206C-A458-4A1E-9E3C-915A50640540}"/>
+                </a:ext>
+              </a:extLst>
+            </p:cNvPr>
+            <p:cNvCxnSpPr/>
+            <p:nvPr/>
+          </p:nvCxnSpPr>
+          <p:spPr>
+            <a:xfrm rot="16200000" flipH="1">
+              <a:off x="5942805" y="2666206"/>
+              <a:ext cx="2895600" cy="1588"/>
+            </a:xfrm>
+            <a:prstGeom prst="line">
+              <a:avLst/>
+            </a:prstGeom>
+          </p:spPr>
+          <p:style>
+            <a:lnRef idx="1">
+              <a:schemeClr val="accent1"/>
+            </a:lnRef>
+            <a:fillRef idx="0">
+              <a:schemeClr val="accent1"/>
+            </a:fillRef>
+            <a:effectRef idx="0">
+              <a:schemeClr val="accent1"/>
+            </a:effectRef>
+            <a:fontRef idx="minor">
+              <a:schemeClr val="tx1"/>
+            </a:fontRef>
+          </p:style>
+        </p:cxnSp>
+        <p:cxnSp>
+          <p:nvCxnSpPr>
+            <p:cNvPr id="19" name="Straight Connector 22">
+              <a:extLst>
+                <a:ext uri="{FF2B5EF4-FFF2-40B4-BE49-F238E27FC236}">
+                  <a16:creationId xmlns:a16="http://schemas.microsoft.com/office/drawing/2014/main" id="{5FE6DD70-8C63-486B-8999-438D5510FB90}"/>
+                </a:ext>
+              </a:extLst>
+            </p:cNvPr>
+            <p:cNvCxnSpPr/>
+            <p:nvPr/>
+          </p:nvCxnSpPr>
+          <p:spPr>
+            <a:xfrm rot="16200000" flipH="1">
+              <a:off x="6323805" y="2666206"/>
+              <a:ext cx="2895600" cy="1588"/>
+            </a:xfrm>
+            <a:prstGeom prst="line">
+              <a:avLst/>
+            </a:prstGeom>
+          </p:spPr>
+          <p:style>
+            <a:lnRef idx="1">
+              <a:schemeClr val="accent1"/>
+            </a:lnRef>
+            <a:fillRef idx="0">
+              <a:schemeClr val="accent1"/>
+            </a:fillRef>
+            <a:effectRef idx="0">
+              <a:schemeClr val="accent1"/>
+            </a:effectRef>
+            <a:fontRef idx="minor">
+              <a:schemeClr val="tx1"/>
+            </a:fontRef>
+          </p:style>
+        </p:cxnSp>
+        <p:cxnSp>
+          <p:nvCxnSpPr>
+            <p:cNvPr id="20" name="Straight Connector 23">
+              <a:extLst>
+                <a:ext uri="{FF2B5EF4-FFF2-40B4-BE49-F238E27FC236}">
+                  <a16:creationId xmlns:a16="http://schemas.microsoft.com/office/drawing/2014/main" id="{1C841C1A-50A6-41BE-9898-5CA883838955}"/>
+                </a:ext>
+              </a:extLst>
+            </p:cNvPr>
+            <p:cNvCxnSpPr/>
+            <p:nvPr/>
+          </p:nvCxnSpPr>
+          <p:spPr>
+            <a:xfrm rot="16200000" flipH="1">
+              <a:off x="6704806" y="2666206"/>
+              <a:ext cx="2895600" cy="1588"/>
+            </a:xfrm>
+            <a:prstGeom prst="line">
+              <a:avLst/>
+            </a:prstGeom>
+          </p:spPr>
+          <p:style>
+            <a:lnRef idx="1">
+              <a:schemeClr val="accent1"/>
+            </a:lnRef>
+            <a:fillRef idx="0">
+              <a:schemeClr val="accent1"/>
+            </a:fillRef>
+            <a:effectRef idx="0">
+              <a:schemeClr val="accent1"/>
+            </a:effectRef>
+            <a:fontRef idx="minor">
+              <a:schemeClr val="tx1"/>
+            </a:fontRef>
+          </p:style>
+        </p:cxnSp>
+        <p:cxnSp>
+          <p:nvCxnSpPr>
+            <p:cNvPr id="21" name="Straight Connector 26">
+              <a:extLst>
+                <a:ext uri="{FF2B5EF4-FFF2-40B4-BE49-F238E27FC236}">
+                  <a16:creationId xmlns:a16="http://schemas.microsoft.com/office/drawing/2014/main" id="{4A659179-75C6-464A-88D6-02098C2EF060}"/>
+                </a:ext>
+              </a:extLst>
+            </p:cNvPr>
+            <p:cNvCxnSpPr/>
+            <p:nvPr/>
+          </p:nvCxnSpPr>
+          <p:spPr>
+            <a:xfrm rot="16200000" flipH="1">
+              <a:off x="4876006" y="2667000"/>
+              <a:ext cx="2895600" cy="1588"/>
+            </a:xfrm>
+            <a:prstGeom prst="line">
+              <a:avLst/>
+            </a:prstGeom>
+          </p:spPr>
+          <p:style>
+            <a:lnRef idx="1">
+              <a:schemeClr val="accent1"/>
+            </a:lnRef>
+            <a:fillRef idx="0">
+              <a:schemeClr val="accent1"/>
+            </a:fillRef>
+            <a:effectRef idx="0">
+              <a:schemeClr val="accent1"/>
+            </a:effectRef>
+            <a:fontRef idx="minor">
+              <a:schemeClr val="tx1"/>
+            </a:fontRef>
+          </p:style>
+        </p:cxnSp>
+        <p:cxnSp>
+          <p:nvCxnSpPr>
+            <p:cNvPr id="22" name="Straight Connector 27">
+              <a:extLst>
+                <a:ext uri="{FF2B5EF4-FFF2-40B4-BE49-F238E27FC236}">
+                  <a16:creationId xmlns:a16="http://schemas.microsoft.com/office/drawing/2014/main" id="{96022869-4DB8-4816-9BB2-5B4DF058B56F}"/>
+                </a:ext>
+              </a:extLst>
+            </p:cNvPr>
+            <p:cNvCxnSpPr/>
+            <p:nvPr/>
+          </p:nvCxnSpPr>
+          <p:spPr>
+            <a:xfrm rot="16200000" flipH="1">
+              <a:off x="5104606" y="2818606"/>
+              <a:ext cx="3200400" cy="1588"/>
+            </a:xfrm>
+            <a:prstGeom prst="line">
+              <a:avLst/>
+            </a:prstGeom>
+          </p:spPr>
+          <p:style>
+            <a:lnRef idx="1">
+              <a:schemeClr val="accent1"/>
+            </a:lnRef>
+            <a:fillRef idx="0">
+              <a:schemeClr val="accent1"/>
+            </a:fillRef>
+            <a:effectRef idx="0">
+              <a:schemeClr val="accent1"/>
+            </a:effectRef>
+            <a:fontRef idx="minor">
+              <a:schemeClr val="tx1"/>
+            </a:fontRef>
+          </p:style>
+        </p:cxnSp>
+        <p:cxnSp>
+          <p:nvCxnSpPr>
+            <p:cNvPr id="23" name="Straight Connector 28">
+              <a:extLst>
+                <a:ext uri="{FF2B5EF4-FFF2-40B4-BE49-F238E27FC236}">
+                  <a16:creationId xmlns:a16="http://schemas.microsoft.com/office/drawing/2014/main" id="{4275D56C-E988-4C97-8E79-BE58544A03F1}"/>
+                </a:ext>
+              </a:extLst>
+            </p:cNvPr>
+            <p:cNvCxnSpPr/>
+            <p:nvPr/>
+          </p:nvCxnSpPr>
+          <p:spPr>
+            <a:xfrm rot="16200000" flipH="1">
+              <a:off x="4114006" y="2667001"/>
+              <a:ext cx="2895600" cy="1588"/>
+            </a:xfrm>
+            <a:prstGeom prst="line">
+              <a:avLst/>
+            </a:prstGeom>
+          </p:spPr>
+          <p:style>
+            <a:lnRef idx="1">
+              <a:schemeClr val="accent1"/>
+            </a:lnRef>
+            <a:fillRef idx="0">
+              <a:schemeClr val="accent1"/>
+            </a:fillRef>
+            <a:effectRef idx="0">
+              <a:schemeClr val="accent1"/>
+            </a:effectRef>
+            <a:fontRef idx="minor">
+              <a:schemeClr val="tx1"/>
+            </a:fontRef>
+          </p:style>
+        </p:cxnSp>
+        <p:cxnSp>
+          <p:nvCxnSpPr>
+            <p:cNvPr id="24" name="Straight Connector 29">
+              <a:extLst>
+                <a:ext uri="{FF2B5EF4-FFF2-40B4-BE49-F238E27FC236}">
+                  <a16:creationId xmlns:a16="http://schemas.microsoft.com/office/drawing/2014/main" id="{D093817F-5255-45D7-B796-162D3B8F70A0}"/>
+                </a:ext>
+              </a:extLst>
+            </p:cNvPr>
+            <p:cNvCxnSpPr/>
+            <p:nvPr/>
+          </p:nvCxnSpPr>
+          <p:spPr>
+            <a:xfrm rot="16200000" flipH="1">
+              <a:off x="4495006" y="2666207"/>
+              <a:ext cx="2895600" cy="1588"/>
+            </a:xfrm>
+            <a:prstGeom prst="line">
+              <a:avLst/>
+            </a:prstGeom>
+          </p:spPr>
+          <p:style>
+            <a:lnRef idx="1">
+              <a:schemeClr val="accent1"/>
+            </a:lnRef>
+            <a:fillRef idx="0">
+              <a:schemeClr val="accent1"/>
+            </a:fillRef>
+            <a:effectRef idx="0">
+              <a:schemeClr val="accent1"/>
+            </a:effectRef>
+            <a:fontRef idx="minor">
+              <a:schemeClr val="tx1"/>
+            </a:fontRef>
+          </p:style>
+        </p:cxnSp>
+        <p:cxnSp>
+          <p:nvCxnSpPr>
+            <p:cNvPr id="25" name="Straight Arrow Connector 35">
+              <a:extLst>
+                <a:ext uri="{FF2B5EF4-FFF2-40B4-BE49-F238E27FC236}">
+                  <a16:creationId xmlns:a16="http://schemas.microsoft.com/office/drawing/2014/main" id="{C483F3FF-7187-40BC-A438-CFB6703A7437}"/>
+                </a:ext>
+              </a:extLst>
+            </p:cNvPr>
+            <p:cNvCxnSpPr/>
+            <p:nvPr/>
+          </p:nvCxnSpPr>
+          <p:spPr>
+            <a:xfrm>
+              <a:off x="6692537" y="4280263"/>
+              <a:ext cx="381000" cy="1588"/>
+            </a:xfrm>
+            <a:prstGeom prst="straightConnector1">
+              <a:avLst/>
+            </a:prstGeom>
+            <a:ln w="25400">
+              <a:headEnd type="triangle"/>
+              <a:tailEnd type="triangle"/>
+            </a:ln>
+          </p:spPr>
+          <p:style>
+            <a:lnRef idx="1">
+              <a:schemeClr val="accent1"/>
+            </a:lnRef>
+            <a:fillRef idx="0">
+              <a:schemeClr val="accent1"/>
+            </a:fillRef>
+            <a:effectRef idx="0">
+              <a:schemeClr val="accent1"/>
+            </a:effectRef>
+            <a:fontRef idx="minor">
+              <a:schemeClr val="tx1"/>
+            </a:fontRef>
+          </p:style>
+        </p:cxnSp>
+        <p:sp>
+          <p:nvSpPr>
+            <p:cNvPr id="26" name="TextBox 38">
+              <a:extLst>
+                <a:ext uri="{FF2B5EF4-FFF2-40B4-BE49-F238E27FC236}">
+                  <a16:creationId xmlns:a16="http://schemas.microsoft.com/office/drawing/2014/main" id="{38108783-B49C-4442-AE71-B7058112040D}"/>
+                </a:ext>
+              </a:extLst>
+            </p:cNvPr>
+            <p:cNvSpPr txBox="1"/>
+            <p:nvPr/>
+          </p:nvSpPr>
+          <p:spPr>
+            <a:xfrm>
+              <a:off x="6629400" y="4267200"/>
+              <a:ext cx="533400" cy="523220"/>
+            </a:xfrm>
+            <a:prstGeom prst="rect">
+              <a:avLst/>
+            </a:prstGeom>
+            <a:noFill/>
+          </p:spPr>
+          <p:txBody>
+            <a:bodyPr wrap="square" rtlCol="0">
+              <a:spAutoFit/>
+            </a:bodyPr>
+            <a:lstStyle/>
+            <a:p>
+              <a:r>
+                <a:rPr lang="en-US" sz="2800" i="1"/>
+                <a:t>dx</a:t>
+              </a:r>
+              <a:endParaRPr lang="en-US" sz="2800" i="1" dirty="0"/>
+            </a:p>
+          </p:txBody>
+        </p:sp>
+        <p:sp>
+          <p:nvSpPr>
+            <p:cNvPr id="27" name="Oval 39">
+              <a:extLst>
+                <a:ext uri="{FF2B5EF4-FFF2-40B4-BE49-F238E27FC236}">
+                  <a16:creationId xmlns:a16="http://schemas.microsoft.com/office/drawing/2014/main" id="{EA4EE49B-EFC1-466E-A593-3BDEC1893F59}"/>
+                </a:ext>
+              </a:extLst>
+            </p:cNvPr>
+            <p:cNvSpPr/>
+            <p:nvPr/>
+          </p:nvSpPr>
+          <p:spPr>
+            <a:xfrm>
+              <a:off x="6973389" y="2575559"/>
+              <a:ext cx="152400" cy="152400"/>
+            </a:xfrm>
+            <a:prstGeom prst="ellipse">
+              <a:avLst/>
+            </a:prstGeom>
+            <a:solidFill>
+              <a:schemeClr val="accent2"/>
+            </a:solidFill>
+          </p:spPr>
+          <p:style>
+            <a:lnRef idx="2">
+              <a:schemeClr val="accent1">
+                <a:shade val="50000"/>
+              </a:schemeClr>
+            </a:lnRef>
+            <a:fillRef idx="1">
+              <a:schemeClr val="accent1"/>
+            </a:fillRef>
+            <a:effectRef idx="0">
+              <a:schemeClr val="accent1"/>
+            </a:effectRef>
+            <a:fontRef idx="minor">
+              <a:schemeClr val="lt1"/>
+            </a:fontRef>
+          </p:style>
+          <p:txBody>
+            <a:bodyPr rtlCol="0" anchor="ctr"/>
+            <a:lstStyle/>
+            <a:p>
+              <a:pPr algn="ctr"/>
+              <a:endParaRPr lang="en-US"/>
+            </a:p>
+          </p:txBody>
+        </p:sp>
+        <p:sp>
+          <p:nvSpPr>
+            <p:cNvPr id="28" name="Oval 40">
+              <a:extLst>
+                <a:ext uri="{FF2B5EF4-FFF2-40B4-BE49-F238E27FC236}">
+                  <a16:creationId xmlns:a16="http://schemas.microsoft.com/office/drawing/2014/main" id="{63FD18DE-243A-49DD-8F0F-75CBA5B4058A}"/>
+                </a:ext>
+              </a:extLst>
+            </p:cNvPr>
+            <p:cNvSpPr/>
+            <p:nvPr/>
+          </p:nvSpPr>
+          <p:spPr>
+            <a:xfrm>
+              <a:off x="7321734" y="2882537"/>
+              <a:ext cx="152400" cy="152400"/>
+            </a:xfrm>
+            <a:prstGeom prst="ellipse">
+              <a:avLst/>
+            </a:prstGeom>
+            <a:solidFill>
+              <a:srgbClr val="7030A0"/>
+            </a:solidFill>
+          </p:spPr>
+          <p:style>
+            <a:lnRef idx="2">
+              <a:schemeClr val="accent1">
+                <a:shade val="50000"/>
+              </a:schemeClr>
+            </a:lnRef>
+            <a:fillRef idx="1">
+              <a:schemeClr val="accent1"/>
+            </a:fillRef>
+            <a:effectRef idx="0">
+              <a:schemeClr val="accent1"/>
+            </a:effectRef>
+            <a:fontRef idx="minor">
+              <a:schemeClr val="lt1"/>
+            </a:fontRef>
+          </p:style>
+          <p:txBody>
+            <a:bodyPr rtlCol="0" anchor="ctr"/>
+            <a:lstStyle/>
+            <a:p>
+              <a:pPr algn="ctr"/>
+              <a:endParaRPr lang="en-US"/>
+            </a:p>
+          </p:txBody>
+        </p:sp>
+        <p:sp>
+          <p:nvSpPr>
+            <p:cNvPr id="29" name="Oval 41">
+              <a:extLst>
+                <a:ext uri="{FF2B5EF4-FFF2-40B4-BE49-F238E27FC236}">
+                  <a16:creationId xmlns:a16="http://schemas.microsoft.com/office/drawing/2014/main" id="{4FDABBBE-8611-458A-8264-E393037EF49E}"/>
+                </a:ext>
+              </a:extLst>
+            </p:cNvPr>
+            <p:cNvSpPr/>
+            <p:nvPr/>
+          </p:nvSpPr>
+          <p:spPr>
+            <a:xfrm>
+              <a:off x="6984274" y="3189515"/>
+              <a:ext cx="152400" cy="152400"/>
+            </a:xfrm>
+            <a:prstGeom prst="ellipse">
+              <a:avLst/>
+            </a:prstGeom>
+            <a:solidFill>
+              <a:srgbClr val="FFC000"/>
+            </a:solidFill>
+          </p:spPr>
+          <p:style>
+            <a:lnRef idx="2">
+              <a:schemeClr val="accent1">
+                <a:shade val="50000"/>
+              </a:schemeClr>
+            </a:lnRef>
+            <a:fillRef idx="1">
+              <a:schemeClr val="accent1"/>
+            </a:fillRef>
+            <a:effectRef idx="0">
+              <a:schemeClr val="accent1"/>
+            </a:effectRef>
+            <a:fontRef idx="minor">
+              <a:schemeClr val="lt1"/>
+            </a:fontRef>
+          </p:style>
+          <p:txBody>
+            <a:bodyPr rtlCol="0" anchor="ctr"/>
+            <a:lstStyle/>
+            <a:p>
+              <a:pPr algn="ctr"/>
+              <a:endParaRPr lang="en-US"/>
+            </a:p>
+          </p:txBody>
+        </p:sp>
+        <p:sp>
+          <p:nvSpPr>
+            <p:cNvPr id="30" name="Oval 42">
+              <a:extLst>
+                <a:ext uri="{FF2B5EF4-FFF2-40B4-BE49-F238E27FC236}">
+                  <a16:creationId xmlns:a16="http://schemas.microsoft.com/office/drawing/2014/main" id="{A2C39EF2-9ADF-46BC-AE10-C9CBB30C361F}"/>
+                </a:ext>
+              </a:extLst>
+            </p:cNvPr>
+            <p:cNvSpPr/>
+            <p:nvPr/>
+          </p:nvSpPr>
+          <p:spPr>
+            <a:xfrm>
+              <a:off x="6640285" y="2893422"/>
+              <a:ext cx="152400" cy="152400"/>
+            </a:xfrm>
+            <a:prstGeom prst="ellipse">
+              <a:avLst/>
+            </a:prstGeom>
+            <a:solidFill>
+              <a:srgbClr val="00B050"/>
+            </a:solidFill>
+          </p:spPr>
+          <p:style>
+            <a:lnRef idx="2">
+              <a:schemeClr val="accent1">
+                <a:shade val="50000"/>
+              </a:schemeClr>
+            </a:lnRef>
+            <a:fillRef idx="1">
+              <a:schemeClr val="accent1"/>
+            </a:fillRef>
+            <a:effectRef idx="0">
+              <a:schemeClr val="accent1"/>
+            </a:effectRef>
+            <a:fontRef idx="minor">
+              <a:schemeClr val="lt1"/>
+            </a:fontRef>
+          </p:style>
+          <p:txBody>
+            <a:bodyPr rtlCol="0" anchor="ctr"/>
+            <a:lstStyle/>
+            <a:p>
+              <a:pPr algn="ctr"/>
+              <a:endParaRPr lang="en-US"/>
+            </a:p>
+          </p:txBody>
+        </p:sp>
+        <p:sp>
+          <p:nvSpPr>
+            <p:cNvPr id="31" name="Oval 43">
+              <a:extLst>
+                <a:ext uri="{FF2B5EF4-FFF2-40B4-BE49-F238E27FC236}">
+                  <a16:creationId xmlns:a16="http://schemas.microsoft.com/office/drawing/2014/main" id="{4FF0B725-8C35-4922-8E84-C58B28FB35AB}"/>
+                </a:ext>
+              </a:extLst>
+            </p:cNvPr>
+            <p:cNvSpPr/>
+            <p:nvPr/>
+          </p:nvSpPr>
+          <p:spPr>
+            <a:xfrm>
+              <a:off x="6971211" y="2882537"/>
+              <a:ext cx="152400" cy="152400"/>
+            </a:xfrm>
+            <a:prstGeom prst="ellipse">
+              <a:avLst/>
+            </a:prstGeom>
+            <a:solidFill>
+              <a:srgbClr val="C00000"/>
+            </a:solidFill>
+          </p:spPr>
+          <p:style>
+            <a:lnRef idx="2">
+              <a:schemeClr val="accent1">
+                <a:shade val="50000"/>
+              </a:schemeClr>
+            </a:lnRef>
+            <a:fillRef idx="1">
+              <a:schemeClr val="accent1"/>
+            </a:fillRef>
+            <a:effectRef idx="0">
+              <a:schemeClr val="accent1"/>
+            </a:effectRef>
+            <a:fontRef idx="minor">
+              <a:schemeClr val="lt1"/>
+            </a:fontRef>
+          </p:style>
+          <p:txBody>
+            <a:bodyPr rtlCol="0" anchor="ctr"/>
+            <a:lstStyle/>
+            <a:p>
+              <a:pPr algn="ctr"/>
+              <a:endParaRPr lang="en-US"/>
+            </a:p>
+          </p:txBody>
+        </p:sp>
+        <p:sp>
+          <p:nvSpPr>
+            <p:cNvPr id="32" name="TextBox 51">
+              <a:extLst>
+                <a:ext uri="{FF2B5EF4-FFF2-40B4-BE49-F238E27FC236}">
+                  <a16:creationId xmlns:a16="http://schemas.microsoft.com/office/drawing/2014/main" id="{E71B8334-AD7C-40FD-9277-B38CD8EF9B80}"/>
+                </a:ext>
+              </a:extLst>
+            </p:cNvPr>
+            <p:cNvSpPr txBox="1"/>
+            <p:nvPr/>
+          </p:nvSpPr>
+          <p:spPr>
+            <a:xfrm>
+              <a:off x="7543799" y="4267200"/>
+              <a:ext cx="912812" cy="523220"/>
+            </a:xfrm>
+            <a:prstGeom prst="rect">
+              <a:avLst/>
+            </a:prstGeom>
+            <a:noFill/>
+          </p:spPr>
+          <p:txBody>
+            <a:bodyPr wrap="square" rtlCol="0">
+              <a:spAutoFit/>
+            </a:bodyPr>
+            <a:lstStyle/>
+            <a:p>
+              <a:pPr algn="ctr"/>
+              <a:r>
+                <a:rPr lang="en-US" sz="2800" i="1">
+                  <a:solidFill>
+                    <a:srgbClr val="FF0000"/>
+                  </a:solidFill>
+                </a:rPr>
+                <a:t>(l,m)</a:t>
+              </a:r>
+              <a:endParaRPr lang="en-US" sz="2800" i="1" dirty="0">
+                <a:solidFill>
+                  <a:srgbClr val="FF0000"/>
+                </a:solidFill>
+              </a:endParaRPr>
+            </a:p>
+          </p:txBody>
+        </p:sp>
+        <p:cxnSp>
+          <p:nvCxnSpPr>
+            <p:cNvPr id="33" name="Straight Arrow Connector 53">
+              <a:extLst>
+                <a:ext uri="{FF2B5EF4-FFF2-40B4-BE49-F238E27FC236}">
+                  <a16:creationId xmlns:a16="http://schemas.microsoft.com/office/drawing/2014/main" id="{76B71BCE-1808-4856-AE6C-DCBE0C88B78A}"/>
+                </a:ext>
+              </a:extLst>
+            </p:cNvPr>
+            <p:cNvCxnSpPr/>
+            <p:nvPr/>
+          </p:nvCxnSpPr>
+          <p:spPr>
+            <a:xfrm rot="16200000" flipV="1">
+              <a:off x="6901542" y="3254827"/>
+              <a:ext cx="1219200" cy="827315"/>
+            </a:xfrm>
+            <a:prstGeom prst="straightConnector1">
+              <a:avLst/>
+            </a:prstGeom>
+            <a:ln w="31750">
+              <a:solidFill>
+                <a:srgbClr val="C00000"/>
+              </a:solidFill>
+              <a:tailEnd type="arrow"/>
+            </a:ln>
+          </p:spPr>
+          <p:style>
+            <a:lnRef idx="1">
+              <a:schemeClr val="accent1"/>
+            </a:lnRef>
+            <a:fillRef idx="0">
+              <a:schemeClr val="accent1"/>
+            </a:fillRef>
+            <a:effectRef idx="0">
+              <a:schemeClr val="accent1"/>
+            </a:effectRef>
+            <a:fontRef idx="minor">
+              <a:schemeClr val="tx1"/>
+            </a:fontRef>
+          </p:style>
+        </p:cxnSp>
+      </p:grpSp>
     </p:spTree>
     <p:extLst>
       <p:ext uri="{BB962C8B-B14F-4D97-AF65-F5344CB8AC3E}">
-        <p14:creationId xmlns:p14="http://schemas.microsoft.com/office/powerpoint/2010/main" val="2365241059"/>
+        <p14:creationId xmlns:p14="http://schemas.microsoft.com/office/powerpoint/2010/main" val="4088648671"/>
       </p:ext>
     </p:extLst>
   </p:cSld>
@@ -4416,6 +5796,1075 @@
           <a:p>
             <a:r>
               <a:rPr lang="en-US"/>
+              <a:t>Cài đặt (Tiếp)</a:t>
+            </a:r>
+            <a:endParaRPr lang="en-US" dirty="0"/>
+          </a:p>
+        </p:txBody>
+      </p:sp>
+      <p:sp>
+        <p:nvSpPr>
+          <p:cNvPr id="3" name="Chỗ dành sẵn cho Số hiệu Bản chiếu 2">
+            <a:extLst>
+              <a:ext uri="{FF2B5EF4-FFF2-40B4-BE49-F238E27FC236}">
+                <a16:creationId xmlns:a16="http://schemas.microsoft.com/office/drawing/2014/main" id="{7D3F13AC-E359-4B69-BE36-5FDBAA0906AA}"/>
+              </a:ext>
+            </a:extLst>
+          </p:cNvPr>
+          <p:cNvSpPr>
+            <a:spLocks noGrp="1"/>
+          </p:cNvSpPr>
+          <p:nvPr>
+            <p:ph type="sldNum" sz="quarter" idx="12"/>
+          </p:nvPr>
+        </p:nvSpPr>
+        <p:spPr/>
+        <p:txBody>
+          <a:bodyPr/>
+          <a:lstStyle/>
+          <a:p>
+            <a:fld id="{A02EBBDA-6239-48A4-BF42-145536EAE284}" type="slidenum">
+              <a:rPr lang="en-US" smtClean="0"/>
+              <a:t>5</a:t>
+            </a:fld>
+            <a:endParaRPr lang="en-US"/>
+          </a:p>
+        </p:txBody>
+      </p:sp>
+      <p:sp>
+        <p:nvSpPr>
+          <p:cNvPr id="5" name="Chỗ dành sẵn cho Nội dung 4">
+            <a:extLst>
+              <a:ext uri="{FF2B5EF4-FFF2-40B4-BE49-F238E27FC236}">
+                <a16:creationId xmlns:a16="http://schemas.microsoft.com/office/drawing/2014/main" id="{BD5EAB61-1F13-473A-9A6B-0B5B78621102}"/>
+              </a:ext>
+            </a:extLst>
+          </p:cNvPr>
+          <p:cNvSpPr>
+            <a:spLocks noGrp="1"/>
+          </p:cNvSpPr>
+          <p:nvPr>
+            <p:ph idx="1"/>
+          </p:nvPr>
+        </p:nvSpPr>
+        <p:spPr/>
+        <p:txBody>
+          <a:bodyPr>
+            <a:normAutofit/>
+          </a:bodyPr>
+          <a:lstStyle/>
+          <a:p>
+            <a:r>
+              <a:rPr lang="en-US" sz="3200">
+                <a:solidFill>
+                  <a:schemeClr val="tx1"/>
+                </a:solidFill>
+              </a:rPr>
+              <a:t>Giải thuật song song</a:t>
+            </a:r>
+          </a:p>
+          <a:p>
+            <a:endParaRPr lang="en-US" sz="2400"/>
+          </a:p>
+        </p:txBody>
+      </p:sp>
+      <p:grpSp>
+        <p:nvGrpSpPr>
+          <p:cNvPr id="6" name="Group 71">
+            <a:extLst>
+              <a:ext uri="{FF2B5EF4-FFF2-40B4-BE49-F238E27FC236}">
+                <a16:creationId xmlns:a16="http://schemas.microsoft.com/office/drawing/2014/main" id="{8E19CE5B-6174-411D-89E8-8BBED71A979C}"/>
+              </a:ext>
+            </a:extLst>
+          </p:cNvPr>
+          <p:cNvGrpSpPr/>
+          <p:nvPr/>
+        </p:nvGrpSpPr>
+        <p:grpSpPr>
+          <a:xfrm>
+            <a:off x="2019300" y="2355129"/>
+            <a:ext cx="5105400" cy="3048000"/>
+            <a:chOff x="1295400" y="2590800"/>
+            <a:chExt cx="5105400" cy="3048000"/>
+          </a:xfrm>
+        </p:grpSpPr>
+        <p:sp>
+          <p:nvSpPr>
+            <p:cNvPr id="7" name="Rectangle 33">
+              <a:extLst>
+                <a:ext uri="{FF2B5EF4-FFF2-40B4-BE49-F238E27FC236}">
+                  <a16:creationId xmlns:a16="http://schemas.microsoft.com/office/drawing/2014/main" id="{7C522B34-D6DC-4B36-916D-4EE161C3CE8D}"/>
+                </a:ext>
+              </a:extLst>
+            </p:cNvPr>
+            <p:cNvSpPr/>
+            <p:nvPr/>
+          </p:nvSpPr>
+          <p:spPr>
+            <a:xfrm>
+              <a:off x="2743200" y="2677180"/>
+              <a:ext cx="3200400" cy="2895600"/>
+            </a:xfrm>
+            <a:prstGeom prst="rect">
+              <a:avLst/>
+            </a:prstGeom>
+            <a:noFill/>
+          </p:spPr>
+          <p:style>
+            <a:lnRef idx="2">
+              <a:schemeClr val="accent1">
+                <a:shade val="50000"/>
+              </a:schemeClr>
+            </a:lnRef>
+            <a:fillRef idx="1">
+              <a:schemeClr val="accent1"/>
+            </a:fillRef>
+            <a:effectRef idx="0">
+              <a:schemeClr val="accent1"/>
+            </a:effectRef>
+            <a:fontRef idx="minor">
+              <a:schemeClr val="lt1"/>
+            </a:fontRef>
+          </p:style>
+          <p:txBody>
+            <a:bodyPr rtlCol="0" anchor="ctr"/>
+            <a:lstStyle/>
+            <a:p>
+              <a:pPr algn="ctr"/>
+              <a:endParaRPr lang="en-US"/>
+            </a:p>
+          </p:txBody>
+        </p:sp>
+        <p:cxnSp>
+          <p:nvCxnSpPr>
+            <p:cNvPr id="8" name="Straight Connector 34">
+              <a:extLst>
+                <a:ext uri="{FF2B5EF4-FFF2-40B4-BE49-F238E27FC236}">
+                  <a16:creationId xmlns:a16="http://schemas.microsoft.com/office/drawing/2014/main" id="{D112622C-DD07-4C76-8759-6A38BC4997D4}"/>
+                </a:ext>
+              </a:extLst>
+            </p:cNvPr>
+            <p:cNvCxnSpPr/>
+            <p:nvPr/>
+          </p:nvCxnSpPr>
+          <p:spPr>
+            <a:xfrm rot="10800000" flipH="1">
+              <a:off x="2743200" y="4124981"/>
+              <a:ext cx="3200400" cy="1588"/>
+            </a:xfrm>
+            <a:prstGeom prst="line">
+              <a:avLst/>
+            </a:prstGeom>
+          </p:spPr>
+          <p:style>
+            <a:lnRef idx="1">
+              <a:schemeClr val="accent1"/>
+            </a:lnRef>
+            <a:fillRef idx="0">
+              <a:schemeClr val="accent1"/>
+            </a:fillRef>
+            <a:effectRef idx="0">
+              <a:schemeClr val="accent1"/>
+            </a:effectRef>
+            <a:fontRef idx="minor">
+              <a:schemeClr val="tx1"/>
+            </a:fontRef>
+          </p:style>
+        </p:cxnSp>
+        <p:cxnSp>
+          <p:nvCxnSpPr>
+            <p:cNvPr id="9" name="Straight Connector 35">
+              <a:extLst>
+                <a:ext uri="{FF2B5EF4-FFF2-40B4-BE49-F238E27FC236}">
+                  <a16:creationId xmlns:a16="http://schemas.microsoft.com/office/drawing/2014/main" id="{5CD348AA-0B54-4400-9092-CF0F59A83A04}"/>
+                </a:ext>
+              </a:extLst>
+            </p:cNvPr>
+            <p:cNvCxnSpPr/>
+            <p:nvPr/>
+          </p:nvCxnSpPr>
+          <p:spPr>
+            <a:xfrm rot="10800000" flipH="1">
+              <a:off x="2743200" y="4428192"/>
+              <a:ext cx="3200400" cy="1588"/>
+            </a:xfrm>
+            <a:prstGeom prst="line">
+              <a:avLst/>
+            </a:prstGeom>
+          </p:spPr>
+          <p:style>
+            <a:lnRef idx="1">
+              <a:schemeClr val="accent1"/>
+            </a:lnRef>
+            <a:fillRef idx="0">
+              <a:schemeClr val="accent1"/>
+            </a:fillRef>
+            <a:effectRef idx="0">
+              <a:schemeClr val="accent1"/>
+            </a:effectRef>
+            <a:fontRef idx="minor">
+              <a:schemeClr val="tx1"/>
+            </a:fontRef>
+          </p:style>
+        </p:cxnSp>
+        <p:cxnSp>
+          <p:nvCxnSpPr>
+            <p:cNvPr id="10" name="Straight Connector 36">
+              <a:extLst>
+                <a:ext uri="{FF2B5EF4-FFF2-40B4-BE49-F238E27FC236}">
+                  <a16:creationId xmlns:a16="http://schemas.microsoft.com/office/drawing/2014/main" id="{175A59B6-4C71-49BA-909C-348EBDAE9C53}"/>
+                </a:ext>
+              </a:extLst>
+            </p:cNvPr>
+            <p:cNvCxnSpPr/>
+            <p:nvPr/>
+          </p:nvCxnSpPr>
+          <p:spPr>
+            <a:xfrm rot="10800000" flipH="1">
+              <a:off x="2743200" y="5037792"/>
+              <a:ext cx="3200400" cy="1588"/>
+            </a:xfrm>
+            <a:prstGeom prst="line">
+              <a:avLst/>
+            </a:prstGeom>
+          </p:spPr>
+          <p:style>
+            <a:lnRef idx="1">
+              <a:schemeClr val="accent1"/>
+            </a:lnRef>
+            <a:fillRef idx="0">
+              <a:schemeClr val="accent1"/>
+            </a:fillRef>
+            <a:effectRef idx="0">
+              <a:schemeClr val="accent1"/>
+            </a:effectRef>
+            <a:fontRef idx="minor">
+              <a:schemeClr val="tx1"/>
+            </a:fontRef>
+          </p:style>
+        </p:cxnSp>
+        <p:cxnSp>
+          <p:nvCxnSpPr>
+            <p:cNvPr id="11" name="Straight Connector 37">
+              <a:extLst>
+                <a:ext uri="{FF2B5EF4-FFF2-40B4-BE49-F238E27FC236}">
+                  <a16:creationId xmlns:a16="http://schemas.microsoft.com/office/drawing/2014/main" id="{4418F60B-7385-4779-BE0C-C6AE46D11403}"/>
+                </a:ext>
+              </a:extLst>
+            </p:cNvPr>
+            <p:cNvCxnSpPr/>
+            <p:nvPr/>
+          </p:nvCxnSpPr>
+          <p:spPr>
+            <a:xfrm rot="10800000" flipH="1">
+              <a:off x="2743200" y="4732992"/>
+              <a:ext cx="3200400" cy="1588"/>
+            </a:xfrm>
+            <a:prstGeom prst="line">
+              <a:avLst/>
+            </a:prstGeom>
+          </p:spPr>
+          <p:style>
+            <a:lnRef idx="1">
+              <a:schemeClr val="accent1"/>
+            </a:lnRef>
+            <a:fillRef idx="0">
+              <a:schemeClr val="accent1"/>
+            </a:fillRef>
+            <a:effectRef idx="0">
+              <a:schemeClr val="accent1"/>
+            </a:effectRef>
+            <a:fontRef idx="minor">
+              <a:schemeClr val="tx1"/>
+            </a:fontRef>
+          </p:style>
+        </p:cxnSp>
+        <p:cxnSp>
+          <p:nvCxnSpPr>
+            <p:cNvPr id="12" name="Straight Connector 38">
+              <a:extLst>
+                <a:ext uri="{FF2B5EF4-FFF2-40B4-BE49-F238E27FC236}">
+                  <a16:creationId xmlns:a16="http://schemas.microsoft.com/office/drawing/2014/main" id="{B1AF26E5-E3C7-47F4-865C-F636411E11AE}"/>
+                </a:ext>
+              </a:extLst>
+            </p:cNvPr>
+            <p:cNvCxnSpPr/>
+            <p:nvPr/>
+          </p:nvCxnSpPr>
+          <p:spPr>
+            <a:xfrm rot="10800000" flipH="1">
+              <a:off x="2743200" y="5342592"/>
+              <a:ext cx="3200400" cy="1588"/>
+            </a:xfrm>
+            <a:prstGeom prst="line">
+              <a:avLst/>
+            </a:prstGeom>
+          </p:spPr>
+          <p:style>
+            <a:lnRef idx="1">
+              <a:schemeClr val="accent1"/>
+            </a:lnRef>
+            <a:fillRef idx="0">
+              <a:schemeClr val="accent1"/>
+            </a:fillRef>
+            <a:effectRef idx="0">
+              <a:schemeClr val="accent1"/>
+            </a:effectRef>
+            <a:fontRef idx="minor">
+              <a:schemeClr val="tx1"/>
+            </a:fontRef>
+          </p:style>
+        </p:cxnSp>
+        <p:cxnSp>
+          <p:nvCxnSpPr>
+            <p:cNvPr id="13" name="Straight Connector 39">
+              <a:extLst>
+                <a:ext uri="{FF2B5EF4-FFF2-40B4-BE49-F238E27FC236}">
+                  <a16:creationId xmlns:a16="http://schemas.microsoft.com/office/drawing/2014/main" id="{CF0C0BCC-61A0-488C-BD51-751616046F4F}"/>
+                </a:ext>
+              </a:extLst>
+            </p:cNvPr>
+            <p:cNvCxnSpPr/>
+            <p:nvPr/>
+          </p:nvCxnSpPr>
+          <p:spPr>
+            <a:xfrm rot="10800000" flipH="1">
+              <a:off x="2743200" y="2904192"/>
+              <a:ext cx="3200400" cy="1588"/>
+            </a:xfrm>
+            <a:prstGeom prst="line">
+              <a:avLst/>
+            </a:prstGeom>
+          </p:spPr>
+          <p:style>
+            <a:lnRef idx="1">
+              <a:schemeClr val="accent1"/>
+            </a:lnRef>
+            <a:fillRef idx="0">
+              <a:schemeClr val="accent1"/>
+            </a:fillRef>
+            <a:effectRef idx="0">
+              <a:schemeClr val="accent1"/>
+            </a:effectRef>
+            <a:fontRef idx="minor">
+              <a:schemeClr val="tx1"/>
+            </a:fontRef>
+          </p:style>
+        </p:cxnSp>
+        <p:cxnSp>
+          <p:nvCxnSpPr>
+            <p:cNvPr id="14" name="Straight Connector 40">
+              <a:extLst>
+                <a:ext uri="{FF2B5EF4-FFF2-40B4-BE49-F238E27FC236}">
+                  <a16:creationId xmlns:a16="http://schemas.microsoft.com/office/drawing/2014/main" id="{B71FEBF7-096E-48C5-83DB-F590C5F551BA}"/>
+                </a:ext>
+              </a:extLst>
+            </p:cNvPr>
+            <p:cNvCxnSpPr/>
+            <p:nvPr/>
+          </p:nvCxnSpPr>
+          <p:spPr>
+            <a:xfrm rot="10800000" flipH="1">
+              <a:off x="2743200" y="3513792"/>
+              <a:ext cx="3200400" cy="1588"/>
+            </a:xfrm>
+            <a:prstGeom prst="line">
+              <a:avLst/>
+            </a:prstGeom>
+          </p:spPr>
+          <p:style>
+            <a:lnRef idx="1">
+              <a:schemeClr val="accent1"/>
+            </a:lnRef>
+            <a:fillRef idx="0">
+              <a:schemeClr val="accent1"/>
+            </a:fillRef>
+            <a:effectRef idx="0">
+              <a:schemeClr val="accent1"/>
+            </a:effectRef>
+            <a:fontRef idx="minor">
+              <a:schemeClr val="tx1"/>
+            </a:fontRef>
+          </p:style>
+        </p:cxnSp>
+        <p:cxnSp>
+          <p:nvCxnSpPr>
+            <p:cNvPr id="15" name="Straight Connector 41">
+              <a:extLst>
+                <a:ext uri="{FF2B5EF4-FFF2-40B4-BE49-F238E27FC236}">
+                  <a16:creationId xmlns:a16="http://schemas.microsoft.com/office/drawing/2014/main" id="{B0A307A6-F865-4145-BDE4-CCE39BE5D60A}"/>
+                </a:ext>
+              </a:extLst>
+            </p:cNvPr>
+            <p:cNvCxnSpPr/>
+            <p:nvPr/>
+          </p:nvCxnSpPr>
+          <p:spPr>
+            <a:xfrm rot="10800000" flipH="1">
+              <a:off x="2743200" y="3208992"/>
+              <a:ext cx="3200400" cy="1588"/>
+            </a:xfrm>
+            <a:prstGeom prst="line">
+              <a:avLst/>
+            </a:prstGeom>
+          </p:spPr>
+          <p:style>
+            <a:lnRef idx="1">
+              <a:schemeClr val="accent1"/>
+            </a:lnRef>
+            <a:fillRef idx="0">
+              <a:schemeClr val="accent1"/>
+            </a:fillRef>
+            <a:effectRef idx="0">
+              <a:schemeClr val="accent1"/>
+            </a:effectRef>
+            <a:fontRef idx="minor">
+              <a:schemeClr val="tx1"/>
+            </a:fontRef>
+          </p:style>
+        </p:cxnSp>
+        <p:cxnSp>
+          <p:nvCxnSpPr>
+            <p:cNvPr id="16" name="Straight Connector 42">
+              <a:extLst>
+                <a:ext uri="{FF2B5EF4-FFF2-40B4-BE49-F238E27FC236}">
+                  <a16:creationId xmlns:a16="http://schemas.microsoft.com/office/drawing/2014/main" id="{EEA73B2F-995A-4870-9EBD-31655722799B}"/>
+                </a:ext>
+              </a:extLst>
+            </p:cNvPr>
+            <p:cNvCxnSpPr/>
+            <p:nvPr/>
+          </p:nvCxnSpPr>
+          <p:spPr>
+            <a:xfrm rot="10800000" flipH="1">
+              <a:off x="2743200" y="3818592"/>
+              <a:ext cx="3200400" cy="1588"/>
+            </a:xfrm>
+            <a:prstGeom prst="line">
+              <a:avLst/>
+            </a:prstGeom>
+          </p:spPr>
+          <p:style>
+            <a:lnRef idx="1">
+              <a:schemeClr val="accent1"/>
+            </a:lnRef>
+            <a:fillRef idx="0">
+              <a:schemeClr val="accent1"/>
+            </a:fillRef>
+            <a:effectRef idx="0">
+              <a:schemeClr val="accent1"/>
+            </a:effectRef>
+            <a:fontRef idx="minor">
+              <a:schemeClr val="tx1"/>
+            </a:fontRef>
+          </p:style>
+        </p:cxnSp>
+        <p:cxnSp>
+          <p:nvCxnSpPr>
+            <p:cNvPr id="17" name="Straight Connector 44">
+              <a:extLst>
+                <a:ext uri="{FF2B5EF4-FFF2-40B4-BE49-F238E27FC236}">
+                  <a16:creationId xmlns:a16="http://schemas.microsoft.com/office/drawing/2014/main" id="{FAA26613-5EC3-44EA-A761-5BE805BB6312}"/>
+                </a:ext>
+              </a:extLst>
+            </p:cNvPr>
+            <p:cNvCxnSpPr/>
+            <p:nvPr/>
+          </p:nvCxnSpPr>
+          <p:spPr>
+            <a:xfrm rot="16200000" flipH="1">
+              <a:off x="3428205" y="4124186"/>
+              <a:ext cx="2895600" cy="1588"/>
+            </a:xfrm>
+            <a:prstGeom prst="line">
+              <a:avLst/>
+            </a:prstGeom>
+          </p:spPr>
+          <p:style>
+            <a:lnRef idx="1">
+              <a:schemeClr val="accent1"/>
+            </a:lnRef>
+            <a:fillRef idx="0">
+              <a:schemeClr val="accent1"/>
+            </a:fillRef>
+            <a:effectRef idx="0">
+              <a:schemeClr val="accent1"/>
+            </a:effectRef>
+            <a:fontRef idx="minor">
+              <a:schemeClr val="tx1"/>
+            </a:fontRef>
+          </p:style>
+        </p:cxnSp>
+        <p:cxnSp>
+          <p:nvCxnSpPr>
+            <p:cNvPr id="18" name="Straight Connector 45">
+              <a:extLst>
+                <a:ext uri="{FF2B5EF4-FFF2-40B4-BE49-F238E27FC236}">
+                  <a16:creationId xmlns:a16="http://schemas.microsoft.com/office/drawing/2014/main" id="{A3CFE471-5966-4685-B019-77E9F866DD77}"/>
+                </a:ext>
+              </a:extLst>
+            </p:cNvPr>
+            <p:cNvCxnSpPr/>
+            <p:nvPr/>
+          </p:nvCxnSpPr>
+          <p:spPr>
+            <a:xfrm rot="16200000" flipH="1">
+              <a:off x="3809205" y="4124186"/>
+              <a:ext cx="2895600" cy="1588"/>
+            </a:xfrm>
+            <a:prstGeom prst="line">
+              <a:avLst/>
+            </a:prstGeom>
+          </p:spPr>
+          <p:style>
+            <a:lnRef idx="1">
+              <a:schemeClr val="accent1"/>
+            </a:lnRef>
+            <a:fillRef idx="0">
+              <a:schemeClr val="accent1"/>
+            </a:fillRef>
+            <a:effectRef idx="0">
+              <a:schemeClr val="accent1"/>
+            </a:effectRef>
+            <a:fontRef idx="minor">
+              <a:schemeClr val="tx1"/>
+            </a:fontRef>
+          </p:style>
+        </p:cxnSp>
+        <p:cxnSp>
+          <p:nvCxnSpPr>
+            <p:cNvPr id="19" name="Straight Connector 46">
+              <a:extLst>
+                <a:ext uri="{FF2B5EF4-FFF2-40B4-BE49-F238E27FC236}">
+                  <a16:creationId xmlns:a16="http://schemas.microsoft.com/office/drawing/2014/main" id="{AA83990E-4A04-4277-9051-508A908B6887}"/>
+                </a:ext>
+              </a:extLst>
+            </p:cNvPr>
+            <p:cNvCxnSpPr/>
+            <p:nvPr/>
+          </p:nvCxnSpPr>
+          <p:spPr>
+            <a:xfrm rot="16200000" flipH="1">
+              <a:off x="4190206" y="4124186"/>
+              <a:ext cx="2895600" cy="1588"/>
+            </a:xfrm>
+            <a:prstGeom prst="line">
+              <a:avLst/>
+            </a:prstGeom>
+          </p:spPr>
+          <p:style>
+            <a:lnRef idx="1">
+              <a:schemeClr val="accent1"/>
+            </a:lnRef>
+            <a:fillRef idx="0">
+              <a:schemeClr val="accent1"/>
+            </a:fillRef>
+            <a:effectRef idx="0">
+              <a:schemeClr val="accent1"/>
+            </a:effectRef>
+            <a:fontRef idx="minor">
+              <a:schemeClr val="tx1"/>
+            </a:fontRef>
+          </p:style>
+        </p:cxnSp>
+        <p:cxnSp>
+          <p:nvCxnSpPr>
+            <p:cNvPr id="20" name="Straight Connector 47">
+              <a:extLst>
+                <a:ext uri="{FF2B5EF4-FFF2-40B4-BE49-F238E27FC236}">
+                  <a16:creationId xmlns:a16="http://schemas.microsoft.com/office/drawing/2014/main" id="{F9FCE62D-7B0F-43C0-B26D-137815CF5F66}"/>
+                </a:ext>
+              </a:extLst>
+            </p:cNvPr>
+            <p:cNvCxnSpPr/>
+            <p:nvPr/>
+          </p:nvCxnSpPr>
+          <p:spPr>
+            <a:xfrm rot="16200000" flipH="1">
+              <a:off x="2361406" y="4124980"/>
+              <a:ext cx="2895600" cy="1588"/>
+            </a:xfrm>
+            <a:prstGeom prst="line">
+              <a:avLst/>
+            </a:prstGeom>
+          </p:spPr>
+          <p:style>
+            <a:lnRef idx="1">
+              <a:schemeClr val="accent1"/>
+            </a:lnRef>
+            <a:fillRef idx="0">
+              <a:schemeClr val="accent1"/>
+            </a:fillRef>
+            <a:effectRef idx="0">
+              <a:schemeClr val="accent1"/>
+            </a:effectRef>
+            <a:fontRef idx="minor">
+              <a:schemeClr val="tx1"/>
+            </a:fontRef>
+          </p:style>
+        </p:cxnSp>
+        <p:cxnSp>
+          <p:nvCxnSpPr>
+            <p:cNvPr id="21" name="Straight Connector 49">
+              <a:extLst>
+                <a:ext uri="{FF2B5EF4-FFF2-40B4-BE49-F238E27FC236}">
+                  <a16:creationId xmlns:a16="http://schemas.microsoft.com/office/drawing/2014/main" id="{64E111CC-381A-4585-A2BD-829E16099D81}"/>
+                </a:ext>
+              </a:extLst>
+            </p:cNvPr>
+            <p:cNvCxnSpPr/>
+            <p:nvPr/>
+          </p:nvCxnSpPr>
+          <p:spPr>
+            <a:xfrm rot="16200000" flipH="1">
+              <a:off x="1599406" y="4124981"/>
+              <a:ext cx="2895600" cy="1588"/>
+            </a:xfrm>
+            <a:prstGeom prst="line">
+              <a:avLst/>
+            </a:prstGeom>
+          </p:spPr>
+          <p:style>
+            <a:lnRef idx="1">
+              <a:schemeClr val="accent1"/>
+            </a:lnRef>
+            <a:fillRef idx="0">
+              <a:schemeClr val="accent1"/>
+            </a:fillRef>
+            <a:effectRef idx="0">
+              <a:schemeClr val="accent1"/>
+            </a:effectRef>
+            <a:fontRef idx="minor">
+              <a:schemeClr val="tx1"/>
+            </a:fontRef>
+          </p:style>
+        </p:cxnSp>
+        <p:cxnSp>
+          <p:nvCxnSpPr>
+            <p:cNvPr id="22" name="Straight Connector 50">
+              <a:extLst>
+                <a:ext uri="{FF2B5EF4-FFF2-40B4-BE49-F238E27FC236}">
+                  <a16:creationId xmlns:a16="http://schemas.microsoft.com/office/drawing/2014/main" id="{12C4D7F6-BFB7-411A-BC15-EE8528058943}"/>
+                </a:ext>
+              </a:extLst>
+            </p:cNvPr>
+            <p:cNvCxnSpPr/>
+            <p:nvPr/>
+          </p:nvCxnSpPr>
+          <p:spPr>
+            <a:xfrm rot="16200000" flipH="1">
+              <a:off x="1980406" y="4124187"/>
+              <a:ext cx="2895600" cy="1588"/>
+            </a:xfrm>
+            <a:prstGeom prst="line">
+              <a:avLst/>
+            </a:prstGeom>
+          </p:spPr>
+          <p:style>
+            <a:lnRef idx="1">
+              <a:schemeClr val="accent1"/>
+            </a:lnRef>
+            <a:fillRef idx="0">
+              <a:schemeClr val="accent1"/>
+            </a:fillRef>
+            <a:effectRef idx="0">
+              <a:schemeClr val="accent1"/>
+            </a:effectRef>
+            <a:fontRef idx="minor">
+              <a:schemeClr val="tx1"/>
+            </a:fontRef>
+          </p:style>
+        </p:cxnSp>
+        <p:cxnSp>
+          <p:nvCxnSpPr>
+            <p:cNvPr id="23" name="Straight Connector 63">
+              <a:extLst>
+                <a:ext uri="{FF2B5EF4-FFF2-40B4-BE49-F238E27FC236}">
+                  <a16:creationId xmlns:a16="http://schemas.microsoft.com/office/drawing/2014/main" id="{E2110A49-D31C-4F2D-A36D-93E65C97395C}"/>
+                </a:ext>
+              </a:extLst>
+            </p:cNvPr>
+            <p:cNvCxnSpPr/>
+            <p:nvPr/>
+          </p:nvCxnSpPr>
+          <p:spPr>
+            <a:xfrm rot="16200000" flipH="1">
+              <a:off x="3048794" y="4114007"/>
+              <a:ext cx="2895600" cy="1588"/>
+            </a:xfrm>
+            <a:prstGeom prst="line">
+              <a:avLst/>
+            </a:prstGeom>
+          </p:spPr>
+          <p:style>
+            <a:lnRef idx="1">
+              <a:schemeClr val="accent1"/>
+            </a:lnRef>
+            <a:fillRef idx="0">
+              <a:schemeClr val="accent1"/>
+            </a:fillRef>
+            <a:effectRef idx="0">
+              <a:schemeClr val="accent1"/>
+            </a:effectRef>
+            <a:fontRef idx="minor">
+              <a:schemeClr val="tx1"/>
+            </a:fontRef>
+          </p:style>
+        </p:cxnSp>
+        <p:cxnSp>
+          <p:nvCxnSpPr>
+            <p:cNvPr id="24" name="Straight Connector 64">
+              <a:extLst>
+                <a:ext uri="{FF2B5EF4-FFF2-40B4-BE49-F238E27FC236}">
+                  <a16:creationId xmlns:a16="http://schemas.microsoft.com/office/drawing/2014/main" id="{467C633A-8FB1-4B5B-8791-64DBCA937D85}"/>
+                </a:ext>
+              </a:extLst>
+            </p:cNvPr>
+            <p:cNvCxnSpPr/>
+            <p:nvPr/>
+          </p:nvCxnSpPr>
+          <p:spPr>
+            <a:xfrm rot="16200000" flipH="1">
+              <a:off x="2693920" y="4114006"/>
+              <a:ext cx="2895600" cy="1588"/>
+            </a:xfrm>
+            <a:prstGeom prst="line">
+              <a:avLst/>
+            </a:prstGeom>
+          </p:spPr>
+          <p:style>
+            <a:lnRef idx="1">
+              <a:schemeClr val="accent1"/>
+            </a:lnRef>
+            <a:fillRef idx="0">
+              <a:schemeClr val="accent1"/>
+            </a:fillRef>
+            <a:effectRef idx="0">
+              <a:schemeClr val="accent1"/>
+            </a:effectRef>
+            <a:fontRef idx="minor">
+              <a:schemeClr val="tx1"/>
+            </a:fontRef>
+          </p:style>
+        </p:cxnSp>
+        <p:sp>
+          <p:nvSpPr>
+            <p:cNvPr id="25" name="Rectangle 65">
+              <a:extLst>
+                <a:ext uri="{FF2B5EF4-FFF2-40B4-BE49-F238E27FC236}">
+                  <a16:creationId xmlns:a16="http://schemas.microsoft.com/office/drawing/2014/main" id="{32CB67A7-CB96-4699-9992-F240288B22E7}"/>
+                </a:ext>
+              </a:extLst>
+            </p:cNvPr>
+            <p:cNvSpPr/>
+            <p:nvPr/>
+          </p:nvSpPr>
+          <p:spPr>
+            <a:xfrm>
+              <a:off x="1295400" y="4572000"/>
+              <a:ext cx="5105400" cy="1066800"/>
+            </a:xfrm>
+            <a:prstGeom prst="rect">
+              <a:avLst/>
+            </a:prstGeom>
+            <a:noFill/>
+            <a:ln>
+              <a:solidFill>
+                <a:srgbClr val="C00000"/>
+              </a:solidFill>
+              <a:prstDash val="dash"/>
+            </a:ln>
+          </p:spPr>
+          <p:style>
+            <a:lnRef idx="2">
+              <a:schemeClr val="accent1">
+                <a:shade val="50000"/>
+              </a:schemeClr>
+            </a:lnRef>
+            <a:fillRef idx="1">
+              <a:schemeClr val="accent1"/>
+            </a:fillRef>
+            <a:effectRef idx="0">
+              <a:schemeClr val="accent1"/>
+            </a:effectRef>
+            <a:fontRef idx="minor">
+              <a:schemeClr val="lt1"/>
+            </a:fontRef>
+          </p:style>
+          <p:txBody>
+            <a:bodyPr rtlCol="0" anchor="ctr"/>
+            <a:lstStyle/>
+            <a:p>
+              <a:pPr algn="ctr"/>
+              <a:endParaRPr lang="en-US"/>
+            </a:p>
+          </p:txBody>
+        </p:sp>
+        <p:sp>
+          <p:nvSpPr>
+            <p:cNvPr id="26" name="Rectangle 66">
+              <a:extLst>
+                <a:ext uri="{FF2B5EF4-FFF2-40B4-BE49-F238E27FC236}">
+                  <a16:creationId xmlns:a16="http://schemas.microsoft.com/office/drawing/2014/main" id="{6A0037C9-A102-4CF8-AED1-4AD67514D0C0}"/>
+                </a:ext>
+              </a:extLst>
+            </p:cNvPr>
+            <p:cNvSpPr/>
+            <p:nvPr/>
+          </p:nvSpPr>
+          <p:spPr>
+            <a:xfrm>
+              <a:off x="1295400" y="2590800"/>
+              <a:ext cx="5105400" cy="1066800"/>
+            </a:xfrm>
+            <a:prstGeom prst="rect">
+              <a:avLst/>
+            </a:prstGeom>
+            <a:noFill/>
+            <a:ln>
+              <a:solidFill>
+                <a:srgbClr val="C00000"/>
+              </a:solidFill>
+              <a:prstDash val="dash"/>
+            </a:ln>
+          </p:spPr>
+          <p:style>
+            <a:lnRef idx="2">
+              <a:schemeClr val="accent1">
+                <a:shade val="50000"/>
+              </a:schemeClr>
+            </a:lnRef>
+            <a:fillRef idx="1">
+              <a:schemeClr val="accent1"/>
+            </a:fillRef>
+            <a:effectRef idx="0">
+              <a:schemeClr val="accent1"/>
+            </a:effectRef>
+            <a:fontRef idx="minor">
+              <a:schemeClr val="lt1"/>
+            </a:fontRef>
+          </p:style>
+          <p:txBody>
+            <a:bodyPr rtlCol="0" anchor="ctr"/>
+            <a:lstStyle/>
+            <a:p>
+              <a:pPr algn="ctr"/>
+              <a:endParaRPr lang="en-US"/>
+            </a:p>
+          </p:txBody>
+        </p:sp>
+        <p:sp>
+          <p:nvSpPr>
+            <p:cNvPr id="27" name="Rectangle 67">
+              <a:extLst>
+                <a:ext uri="{FF2B5EF4-FFF2-40B4-BE49-F238E27FC236}">
+                  <a16:creationId xmlns:a16="http://schemas.microsoft.com/office/drawing/2014/main" id="{0EB74CE9-8B48-40A5-9861-09BD66479F81}"/>
+                </a:ext>
+              </a:extLst>
+            </p:cNvPr>
+            <p:cNvSpPr/>
+            <p:nvPr/>
+          </p:nvSpPr>
+          <p:spPr>
+            <a:xfrm>
+              <a:off x="1295400" y="3657600"/>
+              <a:ext cx="5105400" cy="914400"/>
+            </a:xfrm>
+            <a:prstGeom prst="rect">
+              <a:avLst/>
+            </a:prstGeom>
+            <a:noFill/>
+            <a:ln>
+              <a:solidFill>
+                <a:srgbClr val="C00000"/>
+              </a:solidFill>
+              <a:prstDash val="dash"/>
+            </a:ln>
+          </p:spPr>
+          <p:style>
+            <a:lnRef idx="2">
+              <a:schemeClr val="accent1">
+                <a:shade val="50000"/>
+              </a:schemeClr>
+            </a:lnRef>
+            <a:fillRef idx="1">
+              <a:schemeClr val="accent1"/>
+            </a:fillRef>
+            <a:effectRef idx="0">
+              <a:schemeClr val="accent1"/>
+            </a:effectRef>
+            <a:fontRef idx="minor">
+              <a:schemeClr val="lt1"/>
+            </a:fontRef>
+          </p:style>
+          <p:txBody>
+            <a:bodyPr rtlCol="0" anchor="ctr"/>
+            <a:lstStyle/>
+            <a:p>
+              <a:pPr algn="ctr"/>
+              <a:endParaRPr lang="en-US"/>
+            </a:p>
+          </p:txBody>
+        </p:sp>
+        <p:sp>
+          <p:nvSpPr>
+            <p:cNvPr id="28" name="TextBox 68">
+              <a:extLst>
+                <a:ext uri="{FF2B5EF4-FFF2-40B4-BE49-F238E27FC236}">
+                  <a16:creationId xmlns:a16="http://schemas.microsoft.com/office/drawing/2014/main" id="{897FAFF4-3AB3-48FC-AC2B-BD8B72BE456E}"/>
+                </a:ext>
+              </a:extLst>
+            </p:cNvPr>
+            <p:cNvSpPr txBox="1"/>
+            <p:nvPr/>
+          </p:nvSpPr>
+          <p:spPr>
+            <a:xfrm>
+              <a:off x="1447800" y="2667000"/>
+              <a:ext cx="1066800" cy="461665"/>
+            </a:xfrm>
+            <a:prstGeom prst="rect">
+              <a:avLst/>
+            </a:prstGeom>
+            <a:noFill/>
+          </p:spPr>
+          <p:txBody>
+            <a:bodyPr wrap="square" rtlCol="0">
+              <a:spAutoFit/>
+            </a:bodyPr>
+            <a:lstStyle/>
+            <a:p>
+              <a:r>
+                <a:rPr lang="en-US" sz="2400" dirty="0"/>
+                <a:t>CPU0</a:t>
+              </a:r>
+            </a:p>
+          </p:txBody>
+        </p:sp>
+        <p:sp>
+          <p:nvSpPr>
+            <p:cNvPr id="29" name="TextBox 69">
+              <a:extLst>
+                <a:ext uri="{FF2B5EF4-FFF2-40B4-BE49-F238E27FC236}">
+                  <a16:creationId xmlns:a16="http://schemas.microsoft.com/office/drawing/2014/main" id="{256FE211-E8BE-485A-9F5E-A16BD8AEABE6}"/>
+                </a:ext>
+              </a:extLst>
+            </p:cNvPr>
+            <p:cNvSpPr txBox="1"/>
+            <p:nvPr/>
+          </p:nvSpPr>
+          <p:spPr>
+            <a:xfrm>
+              <a:off x="1447800" y="3653135"/>
+              <a:ext cx="1066800" cy="461665"/>
+            </a:xfrm>
+            <a:prstGeom prst="rect">
+              <a:avLst/>
+            </a:prstGeom>
+            <a:noFill/>
+          </p:spPr>
+          <p:txBody>
+            <a:bodyPr wrap="square" rtlCol="0">
+              <a:spAutoFit/>
+            </a:bodyPr>
+            <a:lstStyle/>
+            <a:p>
+              <a:r>
+                <a:rPr lang="en-US" sz="2400" dirty="0"/>
+                <a:t>CPU1</a:t>
+              </a:r>
+            </a:p>
+          </p:txBody>
+        </p:sp>
+        <p:sp>
+          <p:nvSpPr>
+            <p:cNvPr id="30" name="TextBox 70">
+              <a:extLst>
+                <a:ext uri="{FF2B5EF4-FFF2-40B4-BE49-F238E27FC236}">
+                  <a16:creationId xmlns:a16="http://schemas.microsoft.com/office/drawing/2014/main" id="{C3128F5E-2EE2-40BA-BB3C-4D0420A115E8}"/>
+                </a:ext>
+              </a:extLst>
+            </p:cNvPr>
+            <p:cNvSpPr txBox="1"/>
+            <p:nvPr/>
+          </p:nvSpPr>
+          <p:spPr>
+            <a:xfrm>
+              <a:off x="1447800" y="4572000"/>
+              <a:ext cx="1066800" cy="461665"/>
+            </a:xfrm>
+            <a:prstGeom prst="rect">
+              <a:avLst/>
+            </a:prstGeom>
+            <a:noFill/>
+          </p:spPr>
+          <p:txBody>
+            <a:bodyPr wrap="square" rtlCol="0">
+              <a:spAutoFit/>
+            </a:bodyPr>
+            <a:lstStyle/>
+            <a:p>
+              <a:r>
+                <a:rPr lang="en-US" sz="2400" dirty="0"/>
+                <a:t>CPU2</a:t>
+              </a:r>
+            </a:p>
+          </p:txBody>
+        </p:sp>
+      </p:grpSp>
+    </p:spTree>
+    <p:extLst>
+      <p:ext uri="{BB962C8B-B14F-4D97-AF65-F5344CB8AC3E}">
+        <p14:creationId xmlns:p14="http://schemas.microsoft.com/office/powerpoint/2010/main" val="521840336"/>
+      </p:ext>
+    </p:extLst>
+  </p:cSld>
+  <p:clrMapOvr>
+    <a:masterClrMapping/>
+  </p:clrMapOvr>
+</p:sld>
+</file>
+
+<file path=ppt/slides/slide6.xml><?xml version="1.0" encoding="utf-8"?>
+<p:sld xmlns:a="http://schemas.openxmlformats.org/drawingml/2006/main" xmlns:r="http://schemas.openxmlformats.org/officeDocument/2006/relationships" xmlns:p="http://schemas.openxmlformats.org/presentationml/2006/main">
+  <p:cSld>
+    <p:spTree>
+      <p:nvGrpSpPr>
+        <p:cNvPr id="1" name=""/>
+        <p:cNvGrpSpPr/>
+        <p:nvPr/>
+      </p:nvGrpSpPr>
+      <p:grpSpPr>
+        <a:xfrm>
+          <a:off x="0" y="0"/>
+          <a:ext cx="0" cy="0"/>
+          <a:chOff x="0" y="0"/>
+          <a:chExt cx="0" cy="0"/>
+        </a:xfrm>
+      </p:grpSpPr>
+      <p:sp>
+        <p:nvSpPr>
+          <p:cNvPr id="2" name="Title 1">
+            <a:extLst>
+              <a:ext uri="{FF2B5EF4-FFF2-40B4-BE49-F238E27FC236}">
+                <a16:creationId xmlns:a16="http://schemas.microsoft.com/office/drawing/2014/main" id="{3E282A11-A0C2-4CBC-BB96-04B75B9F3EEE}"/>
+              </a:ext>
+            </a:extLst>
+          </p:cNvPr>
+          <p:cNvSpPr>
+            <a:spLocks noGrp="1"/>
+          </p:cNvSpPr>
+          <p:nvPr>
+            <p:ph type="title"/>
+          </p:nvPr>
+        </p:nvSpPr>
+        <p:spPr/>
+        <p:txBody>
+          <a:bodyPr/>
+          <a:lstStyle/>
+          <a:p>
+            <a:r>
+              <a:rPr lang="en-US"/>
               <a:t>Demo</a:t>
             </a:r>
             <a:endParaRPr lang="en-US" dirty="0"/>
@@ -4439,7 +6888,7 @@
         <p:spPr>
           <a:xfrm>
             <a:off x="488950" y="1093510"/>
-            <a:ext cx="8026400" cy="554348"/>
+            <a:ext cx="8026400" cy="1112362"/>
           </a:xfrm>
           <a:prstGeom prst="rect">
             <a:avLst/>
@@ -4638,6 +7087,17 @@
               <a:t>Trạng thái ban đầu (trước khi khuếch tán)</a:t>
             </a:r>
           </a:p>
+          <a:p>
+            <a:pPr lvl="1"/>
+            <a:r>
+              <a:rPr lang="en-US" sz="2500">
+                <a:solidFill>
+                  <a:schemeClr val="tx1"/>
+                </a:solidFill>
+              </a:rPr>
+              <a:t>m = 20, n = 20</a:t>
+            </a:r>
+          </a:p>
         </p:txBody>
       </p:sp>
       <p:sp>
@@ -4663,7 +7123,7 @@
           <a:p>
             <a:fld id="{A02EBBDA-6239-48A4-BF42-145536EAE284}" type="slidenum">
               <a:rPr lang="en-US" smtClean="0"/>
-              <a:t>5</a:t>
+              <a:t>6</a:t>
             </a:fld>
             <a:endParaRPr lang="en-US"/>
           </a:p>
@@ -4671,10 +7131,10 @@
       </p:sp>
       <p:pic>
         <p:nvPicPr>
-          <p:cNvPr id="8" name="Chỗ dành sẵn cho Nội dung 7">
+          <p:cNvPr id="9" name="Chỗ dành sẵn cho Nội dung 8">
             <a:extLst>
               <a:ext uri="{FF2B5EF4-FFF2-40B4-BE49-F238E27FC236}">
-                <a16:creationId xmlns:a16="http://schemas.microsoft.com/office/drawing/2014/main" id="{4A348996-5564-48CD-A509-0AF503EA2117}"/>
+                <a16:creationId xmlns:a16="http://schemas.microsoft.com/office/drawing/2014/main" id="{9A333EB4-FB1B-486F-952F-F5E0C99CAD98}"/>
               </a:ext>
             </a:extLst>
           </p:cNvPr>
@@ -4685,7 +7145,7 @@
             <p:ph idx="1"/>
           </p:nvPr>
         </p:nvPicPr>
-        <p:blipFill>
+        <p:blipFill rotWithShape="1">
           <a:blip r:embed="rId2">
             <a:extLst>
               <a:ext uri="{28A0092B-C50C-407E-A947-70E740481C1C}">
@@ -4693,21 +7153,20 @@
               </a:ext>
             </a:extLst>
           </a:blip>
-          <a:stretch>
-            <a:fillRect/>
-          </a:stretch>
+          <a:srcRect t="9302" b="2241"/>
+          <a:stretch/>
         </p:blipFill>
         <p:spPr>
           <a:xfrm>
-            <a:off x="876874" y="1647858"/>
-            <a:ext cx="7390251" cy="4902200"/>
+            <a:off x="895350" y="2385147"/>
+            <a:ext cx="7353299" cy="4336329"/>
           </a:xfrm>
         </p:spPr>
       </p:pic>
     </p:spTree>
     <p:extLst>
       <p:ext uri="{BB962C8B-B14F-4D97-AF65-F5344CB8AC3E}">
-        <p14:creationId xmlns:p14="http://schemas.microsoft.com/office/powerpoint/2010/main" val="931540863"/>
+        <p14:creationId xmlns:p14="http://schemas.microsoft.com/office/powerpoint/2010/main" val="2172847535"/>
       </p:ext>
     </p:extLst>
   </p:cSld>
@@ -4717,7 +7176,7 @@
 </p:sld>
 </file>
 
-<file path=ppt/slides/slide6.xml><?xml version="1.0" encoding="utf-8"?>
+<file path=ppt/slides/slide7.xml><?xml version="1.0" encoding="utf-8"?>
 <p:sld xmlns:a="http://schemas.openxmlformats.org/drawingml/2006/main" xmlns:r="http://schemas.openxmlformats.org/officeDocument/2006/relationships" xmlns:p="http://schemas.openxmlformats.org/presentationml/2006/main">
   <p:cSld>
     <p:spTree>
@@ -4979,6 +7438,25 @@
               <a:t>Trạng thái ổn định</a:t>
             </a:r>
           </a:p>
+          <a:p>
+            <a:pPr lvl="1"/>
+            <a:r>
+              <a:rPr lang="en-US" sz="2500">
+                <a:solidFill>
+                  <a:schemeClr val="tx1"/>
+                </a:solidFill>
+              </a:rPr>
+              <a:t>m = 20, n = 20</a:t>
+            </a:r>
+          </a:p>
+          <a:p>
+            <a:pPr lvl="1"/>
+            <a:endParaRPr lang="en-US" sz="3000">
+              <a:solidFill>
+                <a:schemeClr val="tx1"/>
+              </a:solidFill>
+            </a:endParaRPr>
+          </a:p>
         </p:txBody>
       </p:sp>
       <p:sp>
@@ -5004,7 +7482,7 @@
           <a:p>
             <a:fld id="{A02EBBDA-6239-48A4-BF42-145536EAE284}" type="slidenum">
               <a:rPr lang="en-US" smtClean="0"/>
-              <a:t>6</a:t>
+              <a:t>7</a:t>
             </a:fld>
             <a:endParaRPr lang="en-US"/>
           </a:p>
@@ -5012,10 +7490,10 @@
       </p:sp>
       <p:pic>
         <p:nvPicPr>
-          <p:cNvPr id="8" name="Chỗ dành sẵn cho Nội dung 7">
+          <p:cNvPr id="9" name="Chỗ dành sẵn cho Nội dung 8" descr="Ảnh có chứa màn hình&#10;&#10;Mô tả được tạo với mức tin cậy rất cao">
             <a:extLst>
               <a:ext uri="{FF2B5EF4-FFF2-40B4-BE49-F238E27FC236}">
-                <a16:creationId xmlns:a16="http://schemas.microsoft.com/office/drawing/2014/main" id="{0B65CA60-F63E-41DE-A1D9-D18D10A82701}"/>
+                <a16:creationId xmlns:a16="http://schemas.microsoft.com/office/drawing/2014/main" id="{F8A1CD12-43F5-431C-989D-DFAE324156EA}"/>
               </a:ext>
             </a:extLst>
           </p:cNvPr>
@@ -5026,7 +7504,7 @@
             <p:ph idx="1"/>
           </p:nvPr>
         </p:nvPicPr>
-        <p:blipFill>
+        <p:blipFill rotWithShape="1">
           <a:blip r:embed="rId2">
             <a:extLst>
               <a:ext uri="{28A0092B-C50C-407E-A947-70E740481C1C}">
@@ -5034,187 +7512,20 @@
               </a:ext>
             </a:extLst>
           </a:blip>
-          <a:stretch>
-            <a:fillRect/>
-          </a:stretch>
+          <a:srcRect t="9267" b="2083"/>
+          <a:stretch/>
         </p:blipFill>
         <p:spPr>
           <a:xfrm>
-            <a:off x="876874" y="1647858"/>
-            <a:ext cx="7390251" cy="4902200"/>
+            <a:off x="895350" y="2375720"/>
+            <a:ext cx="7353299" cy="4345756"/>
           </a:xfrm>
         </p:spPr>
       </p:pic>
     </p:spTree>
     <p:extLst>
       <p:ext uri="{BB962C8B-B14F-4D97-AF65-F5344CB8AC3E}">
-        <p14:creationId xmlns:p14="http://schemas.microsoft.com/office/powerpoint/2010/main" val="2791319770"/>
-      </p:ext>
-    </p:extLst>
-  </p:cSld>
-  <p:clrMapOvr>
-    <a:masterClrMapping/>
-  </p:clrMapOvr>
-</p:sld>
-</file>
-
-<file path=ppt/slides/slide7.xml><?xml version="1.0" encoding="utf-8"?>
-<p:sld xmlns:a="http://schemas.openxmlformats.org/drawingml/2006/main" xmlns:r="http://schemas.openxmlformats.org/officeDocument/2006/relationships" xmlns:p="http://schemas.openxmlformats.org/presentationml/2006/main">
-  <p:cSld>
-    <p:spTree>
-      <p:nvGrpSpPr>
-        <p:cNvPr id="1" name=""/>
-        <p:cNvGrpSpPr/>
-        <p:nvPr/>
-      </p:nvGrpSpPr>
-      <p:grpSpPr>
-        <a:xfrm>
-          <a:off x="0" y="0"/>
-          <a:ext cx="0" cy="0"/>
-          <a:chOff x="0" y="0"/>
-          <a:chExt cx="0" cy="0"/>
-        </a:xfrm>
-      </p:grpSpPr>
-      <p:sp>
-        <p:nvSpPr>
-          <p:cNvPr id="2" name="Title 1">
-            <a:extLst>
-              <a:ext uri="{FF2B5EF4-FFF2-40B4-BE49-F238E27FC236}">
-                <a16:creationId xmlns:a16="http://schemas.microsoft.com/office/drawing/2014/main" id="{3E282A11-A0C2-4CBC-BB96-04B75B9F3EEE}"/>
-              </a:ext>
-            </a:extLst>
-          </p:cNvPr>
-          <p:cNvSpPr>
-            <a:spLocks noGrp="1"/>
-          </p:cNvSpPr>
-          <p:nvPr>
-            <p:ph type="title"/>
-          </p:nvPr>
-        </p:nvSpPr>
-        <p:spPr/>
-        <p:txBody>
-          <a:bodyPr/>
-          <a:lstStyle/>
-          <a:p>
-            <a:r>
-              <a:rPr lang="en-US"/>
-              <a:t>Kết quả</a:t>
-            </a:r>
-            <a:endParaRPr lang="en-US" dirty="0"/>
-          </a:p>
-        </p:txBody>
-      </p:sp>
-      <p:sp>
-        <p:nvSpPr>
-          <p:cNvPr id="4" name="Chỗ dành sẵn cho Nội dung 3">
-            <a:extLst>
-              <a:ext uri="{FF2B5EF4-FFF2-40B4-BE49-F238E27FC236}">
-                <a16:creationId xmlns:a16="http://schemas.microsoft.com/office/drawing/2014/main" id="{923DE44C-E2FD-434A-BA6E-DE8B1A389F2A}"/>
-              </a:ext>
-            </a:extLst>
-          </p:cNvPr>
-          <p:cNvSpPr>
-            <a:spLocks noGrp="1"/>
-          </p:cNvSpPr>
-          <p:nvPr>
-            <p:ph idx="1"/>
-          </p:nvPr>
-        </p:nvSpPr>
-        <p:spPr>
-          <a:xfrm>
-            <a:off x="488950" y="1647858"/>
-            <a:ext cx="8026400" cy="4600541"/>
-          </a:xfrm>
-        </p:spPr>
-        <p:txBody>
-          <a:bodyPr/>
-          <a:lstStyle/>
-          <a:p>
-            <a:r>
-              <a:rPr lang="en-US">
-                <a:solidFill>
-                  <a:schemeClr val="tx1"/>
-                </a:solidFill>
-              </a:rPr>
-              <a:t>Kết quả được lưu trong file “out.txt” và được thể hiện trên đồ thị trên</a:t>
-            </a:r>
-          </a:p>
-          <a:p>
-            <a:r>
-              <a:rPr lang="en-US">
-                <a:solidFill>
-                  <a:schemeClr val="tx1"/>
-                </a:solidFill>
-              </a:rPr>
-              <a:t>File “out.txt” lưu trữ ma trận các giá trị số thực</a:t>
-            </a:r>
-          </a:p>
-          <a:p>
-            <a:r>
-              <a:rPr lang="en-US">
-                <a:solidFill>
-                  <a:schemeClr val="tx1"/>
-                </a:solidFill>
-              </a:rPr>
-              <a:t>Giá trị đó là nồng độ tại vị trí t</a:t>
-            </a:r>
-            <a:r>
-              <a:rPr lang="vi-VN">
-                <a:solidFill>
-                  <a:schemeClr val="tx1"/>
-                </a:solidFill>
-              </a:rPr>
-              <a:t>ư</a:t>
-            </a:r>
-            <a:r>
-              <a:rPr lang="en-US">
-                <a:solidFill>
-                  <a:schemeClr val="tx1"/>
-                </a:solidFill>
-              </a:rPr>
-              <a:t>ơng ứng</a:t>
-            </a:r>
-            <a:endParaRPr lang="vi-VN">
-              <a:solidFill>
-                <a:schemeClr val="tx1"/>
-              </a:solidFill>
-            </a:endParaRPr>
-          </a:p>
-        </p:txBody>
-      </p:sp>
-      <p:sp>
-        <p:nvSpPr>
-          <p:cNvPr id="3" name="Chỗ dành sẵn cho Số hiệu Bản chiếu 2">
-            <a:extLst>
-              <a:ext uri="{FF2B5EF4-FFF2-40B4-BE49-F238E27FC236}">
-                <a16:creationId xmlns:a16="http://schemas.microsoft.com/office/drawing/2014/main" id="{135C1BB5-B8C5-47D3-A2E3-504F956FA4B2}"/>
-              </a:ext>
-            </a:extLst>
-          </p:cNvPr>
-          <p:cNvSpPr>
-            <a:spLocks noGrp="1"/>
-          </p:cNvSpPr>
-          <p:nvPr>
-            <p:ph type="sldNum" sz="quarter" idx="12"/>
-          </p:nvPr>
-        </p:nvSpPr>
-        <p:spPr/>
-        <p:txBody>
-          <a:bodyPr/>
-          <a:lstStyle/>
-          <a:p>
-            <a:fld id="{A02EBBDA-6239-48A4-BF42-145536EAE284}" type="slidenum">
-              <a:rPr lang="en-US" smtClean="0"/>
-              <a:t>7</a:t>
-            </a:fld>
-            <a:endParaRPr lang="en-US"/>
-          </a:p>
-        </p:txBody>
-      </p:sp>
-    </p:spTree>
-    <p:extLst>
-      <p:ext uri="{BB962C8B-B14F-4D97-AF65-F5344CB8AC3E}">
-        <p14:creationId xmlns:p14="http://schemas.microsoft.com/office/powerpoint/2010/main" val="96374730"/>
+        <p14:creationId xmlns:p14="http://schemas.microsoft.com/office/powerpoint/2010/main" val="2011937327"/>
       </p:ext>
     </p:extLst>
   </p:cSld>
@@ -5243,76 +7554,259 @@
       </p:grpSpPr>
       <p:sp>
         <p:nvSpPr>
-          <p:cNvPr id="2" name="Hình chữ nhật 1">
+          <p:cNvPr id="2" name="Title 1">
             <a:extLst>
               <a:ext uri="{FF2B5EF4-FFF2-40B4-BE49-F238E27FC236}">
-                <a16:creationId xmlns:a16="http://schemas.microsoft.com/office/drawing/2014/main" id="{9248F4B9-394E-4451-A00C-ABE41F8BE311}"/>
+                <a16:creationId xmlns:a16="http://schemas.microsoft.com/office/drawing/2014/main" id="{3E282A11-A0C2-4CBC-BB96-04B75B9F3EEE}"/>
               </a:ext>
             </a:extLst>
           </p:cNvPr>
-          <p:cNvSpPr/>
+          <p:cNvSpPr>
+            <a:spLocks noGrp="1"/>
+          </p:cNvSpPr>
+          <p:nvPr>
+            <p:ph type="title"/>
+          </p:nvPr>
+        </p:nvSpPr>
+        <p:spPr/>
+        <p:txBody>
+          <a:bodyPr/>
+          <a:lstStyle/>
+          <a:p>
+            <a:r>
+              <a:rPr lang="en-US"/>
+              <a:t>Demo (Tiếp)</a:t>
+            </a:r>
+            <a:endParaRPr lang="en-US" dirty="0"/>
+          </a:p>
+        </p:txBody>
+      </p:sp>
+      <p:sp>
+        <p:nvSpPr>
+          <p:cNvPr id="7" name="Chỗ dành sẵn cho Nội dung 2">
+            <a:extLst>
+              <a:ext uri="{FF2B5EF4-FFF2-40B4-BE49-F238E27FC236}">
+                <a16:creationId xmlns:a16="http://schemas.microsoft.com/office/drawing/2014/main" id="{648AB71B-1182-462C-943B-703352A92BE7}"/>
+              </a:ext>
+            </a:extLst>
+          </p:cNvPr>
+          <p:cNvSpPr txBox="1">
+            <a:spLocks/>
+          </p:cNvSpPr>
           <p:nvPr/>
         </p:nvSpPr>
         <p:spPr>
           <a:xfrm>
-            <a:off x="2969860" y="2967335"/>
-            <a:ext cx="3656771" cy="923330"/>
+            <a:off x="488950" y="1093510"/>
+            <a:ext cx="8026400" cy="1112362"/>
           </a:xfrm>
           <a:prstGeom prst="rect">
             <a:avLst/>
           </a:prstGeom>
-          <a:noFill/>
         </p:spPr>
         <p:txBody>
-          <a:bodyPr wrap="none" lIns="91440" tIns="45720" rIns="91440" bIns="45720">
-            <a:spAutoFit/>
+          <a:bodyPr vert="horz" lIns="91440" tIns="45720" rIns="91440" bIns="45720" rtlCol="0">
+            <a:noAutofit/>
           </a:bodyPr>
-          <a:lstStyle/>
-          <a:p>
-            <a:pPr algn="ctr"/>
-            <a:r>
-              <a:rPr lang="en-US" sz="5400" b="1">
-                <a:ln w="12700">
-                  <a:solidFill>
-                    <a:schemeClr val="tx2">
-                      <a:lumMod val="75000"/>
-                    </a:schemeClr>
-                  </a:solidFill>
-                  <a:prstDash val="solid"/>
-                </a:ln>
+          <a:lstStyle>
+            <a:lvl1pPr marL="171450" indent="-171450" algn="l" defTabSz="685800" rtl="0" eaLnBrk="1" latinLnBrk="0" hangingPunct="1">
+              <a:lnSpc>
+                <a:spcPct val="90000"/>
+              </a:lnSpc>
+              <a:spcBef>
+                <a:spcPts val="750"/>
+              </a:spcBef>
+              <a:buFont typeface="Arial" panose="020B0604020202020204" pitchFamily="34" charset="0"/>
+              <a:buChar char="•"/>
+              <a:defRPr sz="2100" kern="1200">
                 <a:solidFill>
-                  <a:srgbClr val="C00000"/>
-                </a:solidFill>
-                <a:effectLst>
-                  <a:outerShdw dist="38100" dir="2640000" algn="bl" rotWithShape="0">
-                    <a:schemeClr val="tx2">
-                      <a:lumMod val="75000"/>
-                    </a:schemeClr>
-                  </a:outerShdw>
-                </a:effectLst>
-              </a:rPr>
-              <a:t>THANK YOU</a:t>
-            </a:r>
-            <a:endParaRPr lang="vi-VN" sz="5400" b="1">
-              <a:ln w="12700">
-                <a:solidFill>
-                  <a:schemeClr val="tx2">
+                  <a:schemeClr val="tx1">
                     <a:lumMod val="75000"/>
+                    <a:lumOff val="25000"/>
                   </a:schemeClr>
                 </a:solidFill>
-                <a:prstDash val="solid"/>
-              </a:ln>
-              <a:solidFill>
-                <a:srgbClr val="C00000"/>
-              </a:solidFill>
-              <a:effectLst>
-                <a:outerShdw dist="38100" dir="2640000" algn="bl" rotWithShape="0">
-                  <a:schemeClr val="tx2">
+                <a:latin typeface="+mn-lt"/>
+                <a:ea typeface="+mn-ea"/>
+                <a:cs typeface="+mn-cs"/>
+              </a:defRPr>
+            </a:lvl1pPr>
+            <a:lvl2pPr marL="514350" indent="-171450" algn="l" defTabSz="685800" rtl="0" eaLnBrk="1" latinLnBrk="0" hangingPunct="1">
+              <a:lnSpc>
+                <a:spcPct val="90000"/>
+              </a:lnSpc>
+              <a:spcBef>
+                <a:spcPts val="375"/>
+              </a:spcBef>
+              <a:buFont typeface="Arial" panose="020B0604020202020204" pitchFamily="34" charset="0"/>
+              <a:buChar char="•"/>
+              <a:defRPr sz="1800" kern="1200">
+                <a:solidFill>
+                  <a:schemeClr val="tx1">
                     <a:lumMod val="75000"/>
+                    <a:lumOff val="25000"/>
                   </a:schemeClr>
-                </a:outerShdw>
-              </a:effectLst>
-            </a:endParaRPr>
+                </a:solidFill>
+                <a:latin typeface="+mn-lt"/>
+                <a:ea typeface="+mn-ea"/>
+                <a:cs typeface="+mn-cs"/>
+              </a:defRPr>
+            </a:lvl2pPr>
+            <a:lvl3pPr marL="857250" indent="-171450" algn="l" defTabSz="685800" rtl="0" eaLnBrk="1" latinLnBrk="0" hangingPunct="1">
+              <a:lnSpc>
+                <a:spcPct val="90000"/>
+              </a:lnSpc>
+              <a:spcBef>
+                <a:spcPts val="375"/>
+              </a:spcBef>
+              <a:buFont typeface="Arial" panose="020B0604020202020204" pitchFamily="34" charset="0"/>
+              <a:buChar char="•"/>
+              <a:defRPr sz="1500" kern="1200">
+                <a:solidFill>
+                  <a:schemeClr val="tx1">
+                    <a:lumMod val="75000"/>
+                    <a:lumOff val="25000"/>
+                  </a:schemeClr>
+                </a:solidFill>
+                <a:latin typeface="+mn-lt"/>
+                <a:ea typeface="+mn-ea"/>
+                <a:cs typeface="+mn-cs"/>
+              </a:defRPr>
+            </a:lvl3pPr>
+            <a:lvl4pPr marL="1200150" indent="-171450" algn="l" defTabSz="685800" rtl="0" eaLnBrk="1" latinLnBrk="0" hangingPunct="1">
+              <a:lnSpc>
+                <a:spcPct val="90000"/>
+              </a:lnSpc>
+              <a:spcBef>
+                <a:spcPts val="375"/>
+              </a:spcBef>
+              <a:buFont typeface="Arial" panose="020B0604020202020204" pitchFamily="34" charset="0"/>
+              <a:buChar char="•"/>
+              <a:defRPr sz="1350" kern="1200">
+                <a:solidFill>
+                  <a:schemeClr val="tx1">
+                    <a:lumMod val="75000"/>
+                    <a:lumOff val="25000"/>
+                  </a:schemeClr>
+                </a:solidFill>
+                <a:latin typeface="+mn-lt"/>
+                <a:ea typeface="+mn-ea"/>
+                <a:cs typeface="+mn-cs"/>
+              </a:defRPr>
+            </a:lvl4pPr>
+            <a:lvl5pPr marL="1543050" indent="-171450" algn="l" defTabSz="685800" rtl="0" eaLnBrk="1" latinLnBrk="0" hangingPunct="1">
+              <a:lnSpc>
+                <a:spcPct val="90000"/>
+              </a:lnSpc>
+              <a:spcBef>
+                <a:spcPts val="375"/>
+              </a:spcBef>
+              <a:buFont typeface="Arial" panose="020B0604020202020204" pitchFamily="34" charset="0"/>
+              <a:buChar char="•"/>
+              <a:defRPr sz="1350" kern="1200">
+                <a:solidFill>
+                  <a:schemeClr val="tx1">
+                    <a:lumMod val="75000"/>
+                    <a:lumOff val="25000"/>
+                  </a:schemeClr>
+                </a:solidFill>
+                <a:latin typeface="+mn-lt"/>
+                <a:ea typeface="+mn-ea"/>
+                <a:cs typeface="+mn-cs"/>
+              </a:defRPr>
+            </a:lvl5pPr>
+            <a:lvl6pPr marL="1885950" indent="-171450" algn="l" defTabSz="685800" rtl="0" eaLnBrk="1" latinLnBrk="0" hangingPunct="1">
+              <a:lnSpc>
+                <a:spcPct val="90000"/>
+              </a:lnSpc>
+              <a:spcBef>
+                <a:spcPts val="375"/>
+              </a:spcBef>
+              <a:buFont typeface="Arial" panose="020B0604020202020204" pitchFamily="34" charset="0"/>
+              <a:buChar char="•"/>
+              <a:defRPr sz="1350" kern="1200">
+                <a:solidFill>
+                  <a:schemeClr val="tx1"/>
+                </a:solidFill>
+                <a:latin typeface="+mn-lt"/>
+                <a:ea typeface="+mn-ea"/>
+                <a:cs typeface="+mn-cs"/>
+              </a:defRPr>
+            </a:lvl6pPr>
+            <a:lvl7pPr marL="2228850" indent="-171450" algn="l" defTabSz="685800" rtl="0" eaLnBrk="1" latinLnBrk="0" hangingPunct="1">
+              <a:lnSpc>
+                <a:spcPct val="90000"/>
+              </a:lnSpc>
+              <a:spcBef>
+                <a:spcPts val="375"/>
+              </a:spcBef>
+              <a:buFont typeface="Arial" panose="020B0604020202020204" pitchFamily="34" charset="0"/>
+              <a:buChar char="•"/>
+              <a:defRPr sz="1350" kern="1200">
+                <a:solidFill>
+                  <a:schemeClr val="tx1"/>
+                </a:solidFill>
+                <a:latin typeface="+mn-lt"/>
+                <a:ea typeface="+mn-ea"/>
+                <a:cs typeface="+mn-cs"/>
+              </a:defRPr>
+            </a:lvl7pPr>
+            <a:lvl8pPr marL="2571750" indent="-171450" algn="l" defTabSz="685800" rtl="0" eaLnBrk="1" latinLnBrk="0" hangingPunct="1">
+              <a:lnSpc>
+                <a:spcPct val="90000"/>
+              </a:lnSpc>
+              <a:spcBef>
+                <a:spcPts val="375"/>
+              </a:spcBef>
+              <a:buFont typeface="Arial" panose="020B0604020202020204" pitchFamily="34" charset="0"/>
+              <a:buChar char="•"/>
+              <a:defRPr sz="1350" kern="1200">
+                <a:solidFill>
+                  <a:schemeClr val="tx1"/>
+                </a:solidFill>
+                <a:latin typeface="+mn-lt"/>
+                <a:ea typeface="+mn-ea"/>
+                <a:cs typeface="+mn-cs"/>
+              </a:defRPr>
+            </a:lvl8pPr>
+            <a:lvl9pPr marL="2914650" indent="-171450" algn="l" defTabSz="685800" rtl="0" eaLnBrk="1" latinLnBrk="0" hangingPunct="1">
+              <a:lnSpc>
+                <a:spcPct val="90000"/>
+              </a:lnSpc>
+              <a:spcBef>
+                <a:spcPts val="375"/>
+              </a:spcBef>
+              <a:buFont typeface="Arial" panose="020B0604020202020204" pitchFamily="34" charset="0"/>
+              <a:buChar char="•"/>
+              <a:defRPr sz="1350" kern="1200">
+                <a:solidFill>
+                  <a:schemeClr val="tx1"/>
+                </a:solidFill>
+                <a:latin typeface="+mn-lt"/>
+                <a:ea typeface="+mn-ea"/>
+                <a:cs typeface="+mn-cs"/>
+              </a:defRPr>
+            </a:lvl9pPr>
+          </a:lstStyle>
+          <a:p>
+            <a:r>
+              <a:rPr lang="en-US" sz="3300">
+                <a:solidFill>
+                  <a:schemeClr val="tx1"/>
+                </a:solidFill>
+              </a:rPr>
+              <a:t>Trạng thái ban đầu (trước khi khuếch tán)</a:t>
+            </a:r>
+          </a:p>
+          <a:p>
+            <a:pPr lvl="1"/>
+            <a:r>
+              <a:rPr lang="en-US" sz="2500">
+                <a:solidFill>
+                  <a:schemeClr val="tx1"/>
+                </a:solidFill>
+              </a:rPr>
+              <a:t>m = 100, n = 100</a:t>
+            </a:r>
           </a:p>
         </p:txBody>
       </p:sp>
@@ -5321,7 +7815,7 @@
           <p:cNvPr id="3" name="Chỗ dành sẵn cho Số hiệu Bản chiếu 2">
             <a:extLst>
               <a:ext uri="{FF2B5EF4-FFF2-40B4-BE49-F238E27FC236}">
-                <a16:creationId xmlns:a16="http://schemas.microsoft.com/office/drawing/2014/main" id="{965C8D37-3ADD-4A21-BFCC-41A0B6017781}"/>
+                <a16:creationId xmlns:a16="http://schemas.microsoft.com/office/drawing/2014/main" id="{515799EB-F2A1-49F5-9BEC-A53F1933F7B0}"/>
               </a:ext>
             </a:extLst>
           </p:cNvPr>
@@ -5345,10 +7839,403 @@
           </a:p>
         </p:txBody>
       </p:sp>
+      <p:pic>
+        <p:nvPicPr>
+          <p:cNvPr id="9" name="Chỗ dành sẵn cho Nội dung 8" descr="Ảnh có chứa ảnh chụp màn hình&#10;&#10;Mô tả được tạo với mức tin cậy cao">
+            <a:extLst>
+              <a:ext uri="{FF2B5EF4-FFF2-40B4-BE49-F238E27FC236}">
+                <a16:creationId xmlns:a16="http://schemas.microsoft.com/office/drawing/2014/main" id="{0C6D3C9F-1076-481E-8F4E-494445954D75}"/>
+              </a:ext>
+            </a:extLst>
+          </p:cNvPr>
+          <p:cNvPicPr>
+            <a:picLocks noGrp="1" noChangeAspect="1"/>
+          </p:cNvPicPr>
+          <p:nvPr>
+            <p:ph idx="1"/>
+          </p:nvPr>
+        </p:nvPicPr>
+        <p:blipFill rotWithShape="1">
+          <a:blip r:embed="rId2">
+            <a:extLst>
+              <a:ext uri="{28A0092B-C50C-407E-A947-70E740481C1C}">
+                <a14:useLocalDpi xmlns:a14="http://schemas.microsoft.com/office/drawing/2010/main" val="0"/>
+              </a:ext>
+            </a:extLst>
+          </a:blip>
+          <a:srcRect t="8499" b="1891"/>
+          <a:stretch/>
+        </p:blipFill>
+        <p:spPr>
+          <a:xfrm>
+            <a:off x="895350" y="2328585"/>
+            <a:ext cx="7353299" cy="4392891"/>
+          </a:xfrm>
+        </p:spPr>
+      </p:pic>
     </p:spTree>
     <p:extLst>
       <p:ext uri="{BB962C8B-B14F-4D97-AF65-F5344CB8AC3E}">
-        <p14:creationId xmlns:p14="http://schemas.microsoft.com/office/powerpoint/2010/main" val="3158584091"/>
+        <p14:creationId xmlns:p14="http://schemas.microsoft.com/office/powerpoint/2010/main" val="931540863"/>
+      </p:ext>
+    </p:extLst>
+  </p:cSld>
+  <p:clrMapOvr>
+    <a:masterClrMapping/>
+  </p:clrMapOvr>
+</p:sld>
+</file>
+
+<file path=ppt/slides/slide9.xml><?xml version="1.0" encoding="utf-8"?>
+<p:sld xmlns:a="http://schemas.openxmlformats.org/drawingml/2006/main" xmlns:r="http://schemas.openxmlformats.org/officeDocument/2006/relationships" xmlns:p="http://schemas.openxmlformats.org/presentationml/2006/main">
+  <p:cSld>
+    <p:spTree>
+      <p:nvGrpSpPr>
+        <p:cNvPr id="1" name=""/>
+        <p:cNvGrpSpPr/>
+        <p:nvPr/>
+      </p:nvGrpSpPr>
+      <p:grpSpPr>
+        <a:xfrm>
+          <a:off x="0" y="0"/>
+          <a:ext cx="0" cy="0"/>
+          <a:chOff x="0" y="0"/>
+          <a:chExt cx="0" cy="0"/>
+        </a:xfrm>
+      </p:grpSpPr>
+      <p:sp>
+        <p:nvSpPr>
+          <p:cNvPr id="2" name="Title 1">
+            <a:extLst>
+              <a:ext uri="{FF2B5EF4-FFF2-40B4-BE49-F238E27FC236}">
+                <a16:creationId xmlns:a16="http://schemas.microsoft.com/office/drawing/2014/main" id="{3E282A11-A0C2-4CBC-BB96-04B75B9F3EEE}"/>
+              </a:ext>
+            </a:extLst>
+          </p:cNvPr>
+          <p:cNvSpPr>
+            <a:spLocks noGrp="1"/>
+          </p:cNvSpPr>
+          <p:nvPr>
+            <p:ph type="title"/>
+          </p:nvPr>
+        </p:nvSpPr>
+        <p:spPr/>
+        <p:txBody>
+          <a:bodyPr/>
+          <a:lstStyle/>
+          <a:p>
+            <a:r>
+              <a:rPr lang="en-US"/>
+              <a:t>Demo (Tiếp)</a:t>
+            </a:r>
+            <a:endParaRPr lang="en-US" dirty="0"/>
+          </a:p>
+        </p:txBody>
+      </p:sp>
+      <p:sp>
+        <p:nvSpPr>
+          <p:cNvPr id="7" name="Chỗ dành sẵn cho Nội dung 2">
+            <a:extLst>
+              <a:ext uri="{FF2B5EF4-FFF2-40B4-BE49-F238E27FC236}">
+                <a16:creationId xmlns:a16="http://schemas.microsoft.com/office/drawing/2014/main" id="{648AB71B-1182-462C-943B-703352A92BE7}"/>
+              </a:ext>
+            </a:extLst>
+          </p:cNvPr>
+          <p:cNvSpPr txBox="1">
+            <a:spLocks/>
+          </p:cNvSpPr>
+          <p:nvPr/>
+        </p:nvSpPr>
+        <p:spPr>
+          <a:xfrm>
+            <a:off x="488950" y="1093510"/>
+            <a:ext cx="8026400" cy="554348"/>
+          </a:xfrm>
+          <a:prstGeom prst="rect">
+            <a:avLst/>
+          </a:prstGeom>
+        </p:spPr>
+        <p:txBody>
+          <a:bodyPr vert="horz" lIns="91440" tIns="45720" rIns="91440" bIns="45720" rtlCol="0">
+            <a:noAutofit/>
+          </a:bodyPr>
+          <a:lstStyle>
+            <a:lvl1pPr marL="171450" indent="-171450" algn="l" defTabSz="685800" rtl="0" eaLnBrk="1" latinLnBrk="0" hangingPunct="1">
+              <a:lnSpc>
+                <a:spcPct val="90000"/>
+              </a:lnSpc>
+              <a:spcBef>
+                <a:spcPts val="750"/>
+              </a:spcBef>
+              <a:buFont typeface="Arial" panose="020B0604020202020204" pitchFamily="34" charset="0"/>
+              <a:buChar char="•"/>
+              <a:defRPr sz="2100" kern="1200">
+                <a:solidFill>
+                  <a:schemeClr val="tx1">
+                    <a:lumMod val="75000"/>
+                    <a:lumOff val="25000"/>
+                  </a:schemeClr>
+                </a:solidFill>
+                <a:latin typeface="+mn-lt"/>
+                <a:ea typeface="+mn-ea"/>
+                <a:cs typeface="+mn-cs"/>
+              </a:defRPr>
+            </a:lvl1pPr>
+            <a:lvl2pPr marL="514350" indent="-171450" algn="l" defTabSz="685800" rtl="0" eaLnBrk="1" latinLnBrk="0" hangingPunct="1">
+              <a:lnSpc>
+                <a:spcPct val="90000"/>
+              </a:lnSpc>
+              <a:spcBef>
+                <a:spcPts val="375"/>
+              </a:spcBef>
+              <a:buFont typeface="Arial" panose="020B0604020202020204" pitchFamily="34" charset="0"/>
+              <a:buChar char="•"/>
+              <a:defRPr sz="1800" kern="1200">
+                <a:solidFill>
+                  <a:schemeClr val="tx1">
+                    <a:lumMod val="75000"/>
+                    <a:lumOff val="25000"/>
+                  </a:schemeClr>
+                </a:solidFill>
+                <a:latin typeface="+mn-lt"/>
+                <a:ea typeface="+mn-ea"/>
+                <a:cs typeface="+mn-cs"/>
+              </a:defRPr>
+            </a:lvl2pPr>
+            <a:lvl3pPr marL="857250" indent="-171450" algn="l" defTabSz="685800" rtl="0" eaLnBrk="1" latinLnBrk="0" hangingPunct="1">
+              <a:lnSpc>
+                <a:spcPct val="90000"/>
+              </a:lnSpc>
+              <a:spcBef>
+                <a:spcPts val="375"/>
+              </a:spcBef>
+              <a:buFont typeface="Arial" panose="020B0604020202020204" pitchFamily="34" charset="0"/>
+              <a:buChar char="•"/>
+              <a:defRPr sz="1500" kern="1200">
+                <a:solidFill>
+                  <a:schemeClr val="tx1">
+                    <a:lumMod val="75000"/>
+                    <a:lumOff val="25000"/>
+                  </a:schemeClr>
+                </a:solidFill>
+                <a:latin typeface="+mn-lt"/>
+                <a:ea typeface="+mn-ea"/>
+                <a:cs typeface="+mn-cs"/>
+              </a:defRPr>
+            </a:lvl3pPr>
+            <a:lvl4pPr marL="1200150" indent="-171450" algn="l" defTabSz="685800" rtl="0" eaLnBrk="1" latinLnBrk="0" hangingPunct="1">
+              <a:lnSpc>
+                <a:spcPct val="90000"/>
+              </a:lnSpc>
+              <a:spcBef>
+                <a:spcPts val="375"/>
+              </a:spcBef>
+              <a:buFont typeface="Arial" panose="020B0604020202020204" pitchFamily="34" charset="0"/>
+              <a:buChar char="•"/>
+              <a:defRPr sz="1350" kern="1200">
+                <a:solidFill>
+                  <a:schemeClr val="tx1">
+                    <a:lumMod val="75000"/>
+                    <a:lumOff val="25000"/>
+                  </a:schemeClr>
+                </a:solidFill>
+                <a:latin typeface="+mn-lt"/>
+                <a:ea typeface="+mn-ea"/>
+                <a:cs typeface="+mn-cs"/>
+              </a:defRPr>
+            </a:lvl4pPr>
+            <a:lvl5pPr marL="1543050" indent="-171450" algn="l" defTabSz="685800" rtl="0" eaLnBrk="1" latinLnBrk="0" hangingPunct="1">
+              <a:lnSpc>
+                <a:spcPct val="90000"/>
+              </a:lnSpc>
+              <a:spcBef>
+                <a:spcPts val="375"/>
+              </a:spcBef>
+              <a:buFont typeface="Arial" panose="020B0604020202020204" pitchFamily="34" charset="0"/>
+              <a:buChar char="•"/>
+              <a:defRPr sz="1350" kern="1200">
+                <a:solidFill>
+                  <a:schemeClr val="tx1">
+                    <a:lumMod val="75000"/>
+                    <a:lumOff val="25000"/>
+                  </a:schemeClr>
+                </a:solidFill>
+                <a:latin typeface="+mn-lt"/>
+                <a:ea typeface="+mn-ea"/>
+                <a:cs typeface="+mn-cs"/>
+              </a:defRPr>
+            </a:lvl5pPr>
+            <a:lvl6pPr marL="1885950" indent="-171450" algn="l" defTabSz="685800" rtl="0" eaLnBrk="1" latinLnBrk="0" hangingPunct="1">
+              <a:lnSpc>
+                <a:spcPct val="90000"/>
+              </a:lnSpc>
+              <a:spcBef>
+                <a:spcPts val="375"/>
+              </a:spcBef>
+              <a:buFont typeface="Arial" panose="020B0604020202020204" pitchFamily="34" charset="0"/>
+              <a:buChar char="•"/>
+              <a:defRPr sz="1350" kern="1200">
+                <a:solidFill>
+                  <a:schemeClr val="tx1"/>
+                </a:solidFill>
+                <a:latin typeface="+mn-lt"/>
+                <a:ea typeface="+mn-ea"/>
+                <a:cs typeface="+mn-cs"/>
+              </a:defRPr>
+            </a:lvl6pPr>
+            <a:lvl7pPr marL="2228850" indent="-171450" algn="l" defTabSz="685800" rtl="0" eaLnBrk="1" latinLnBrk="0" hangingPunct="1">
+              <a:lnSpc>
+                <a:spcPct val="90000"/>
+              </a:lnSpc>
+              <a:spcBef>
+                <a:spcPts val="375"/>
+              </a:spcBef>
+              <a:buFont typeface="Arial" panose="020B0604020202020204" pitchFamily="34" charset="0"/>
+              <a:buChar char="•"/>
+              <a:defRPr sz="1350" kern="1200">
+                <a:solidFill>
+                  <a:schemeClr val="tx1"/>
+                </a:solidFill>
+                <a:latin typeface="+mn-lt"/>
+                <a:ea typeface="+mn-ea"/>
+                <a:cs typeface="+mn-cs"/>
+              </a:defRPr>
+            </a:lvl7pPr>
+            <a:lvl8pPr marL="2571750" indent="-171450" algn="l" defTabSz="685800" rtl="0" eaLnBrk="1" latinLnBrk="0" hangingPunct="1">
+              <a:lnSpc>
+                <a:spcPct val="90000"/>
+              </a:lnSpc>
+              <a:spcBef>
+                <a:spcPts val="375"/>
+              </a:spcBef>
+              <a:buFont typeface="Arial" panose="020B0604020202020204" pitchFamily="34" charset="0"/>
+              <a:buChar char="•"/>
+              <a:defRPr sz="1350" kern="1200">
+                <a:solidFill>
+                  <a:schemeClr val="tx1"/>
+                </a:solidFill>
+                <a:latin typeface="+mn-lt"/>
+                <a:ea typeface="+mn-ea"/>
+                <a:cs typeface="+mn-cs"/>
+              </a:defRPr>
+            </a:lvl8pPr>
+            <a:lvl9pPr marL="2914650" indent="-171450" algn="l" defTabSz="685800" rtl="0" eaLnBrk="1" latinLnBrk="0" hangingPunct="1">
+              <a:lnSpc>
+                <a:spcPct val="90000"/>
+              </a:lnSpc>
+              <a:spcBef>
+                <a:spcPts val="375"/>
+              </a:spcBef>
+              <a:buFont typeface="Arial" panose="020B0604020202020204" pitchFamily="34" charset="0"/>
+              <a:buChar char="•"/>
+              <a:defRPr sz="1350" kern="1200">
+                <a:solidFill>
+                  <a:schemeClr val="tx1"/>
+                </a:solidFill>
+                <a:latin typeface="+mn-lt"/>
+                <a:ea typeface="+mn-ea"/>
+                <a:cs typeface="+mn-cs"/>
+              </a:defRPr>
+            </a:lvl9pPr>
+          </a:lstStyle>
+          <a:p>
+            <a:r>
+              <a:rPr lang="en-US" sz="3300">
+                <a:solidFill>
+                  <a:schemeClr val="tx1"/>
+                </a:solidFill>
+              </a:rPr>
+              <a:t>Trạng thái ổn định</a:t>
+            </a:r>
+          </a:p>
+          <a:p>
+            <a:pPr lvl="1"/>
+            <a:r>
+              <a:rPr lang="en-US" sz="2500">
+                <a:solidFill>
+                  <a:schemeClr val="tx1"/>
+                </a:solidFill>
+              </a:rPr>
+              <a:t>m = 100, n = 100</a:t>
+            </a:r>
+          </a:p>
+          <a:p>
+            <a:pPr lvl="1"/>
+            <a:endParaRPr lang="en-US" sz="3000">
+              <a:solidFill>
+                <a:schemeClr val="tx1"/>
+              </a:solidFill>
+            </a:endParaRPr>
+          </a:p>
+        </p:txBody>
+      </p:sp>
+      <p:sp>
+        <p:nvSpPr>
+          <p:cNvPr id="3" name="Chỗ dành sẵn cho Số hiệu Bản chiếu 2">
+            <a:extLst>
+              <a:ext uri="{FF2B5EF4-FFF2-40B4-BE49-F238E27FC236}">
+                <a16:creationId xmlns:a16="http://schemas.microsoft.com/office/drawing/2014/main" id="{515799EB-F2A1-49F5-9BEC-A53F1933F7B0}"/>
+              </a:ext>
+            </a:extLst>
+          </p:cNvPr>
+          <p:cNvSpPr>
+            <a:spLocks noGrp="1"/>
+          </p:cNvSpPr>
+          <p:nvPr>
+            <p:ph type="sldNum" sz="quarter" idx="12"/>
+          </p:nvPr>
+        </p:nvSpPr>
+        <p:spPr/>
+        <p:txBody>
+          <a:bodyPr/>
+          <a:lstStyle/>
+          <a:p>
+            <a:fld id="{A02EBBDA-6239-48A4-BF42-145536EAE284}" type="slidenum">
+              <a:rPr lang="en-US" smtClean="0"/>
+              <a:t>9</a:t>
+            </a:fld>
+            <a:endParaRPr lang="en-US"/>
+          </a:p>
+        </p:txBody>
+      </p:sp>
+      <p:pic>
+        <p:nvPicPr>
+          <p:cNvPr id="10" name="Chỗ dành sẵn cho Nội dung 9">
+            <a:extLst>
+              <a:ext uri="{FF2B5EF4-FFF2-40B4-BE49-F238E27FC236}">
+                <a16:creationId xmlns:a16="http://schemas.microsoft.com/office/drawing/2014/main" id="{108E04F2-C811-4851-8ED2-1C1992AFBF67}"/>
+              </a:ext>
+            </a:extLst>
+          </p:cNvPr>
+          <p:cNvPicPr>
+            <a:picLocks noGrp="1" noChangeAspect="1"/>
+          </p:cNvPicPr>
+          <p:nvPr>
+            <p:ph idx="1"/>
+          </p:nvPr>
+        </p:nvPicPr>
+        <p:blipFill rotWithShape="1">
+          <a:blip r:embed="rId2">
+            <a:extLst>
+              <a:ext uri="{28A0092B-C50C-407E-A947-70E740481C1C}">
+                <a14:useLocalDpi xmlns:a14="http://schemas.microsoft.com/office/drawing/2010/main" val="0"/>
+              </a:ext>
+            </a:extLst>
+          </a:blip>
+          <a:srcRect t="9267" b="2467"/>
+          <a:stretch/>
+        </p:blipFill>
+        <p:spPr>
+          <a:xfrm>
+            <a:off x="895350" y="2394573"/>
+            <a:ext cx="7353300" cy="4326903"/>
+          </a:xfrm>
+        </p:spPr>
+      </p:pic>
+    </p:spTree>
+    <p:extLst>
+      <p:ext uri="{BB962C8B-B14F-4D97-AF65-F5344CB8AC3E}">
+        <p14:creationId xmlns:p14="http://schemas.microsoft.com/office/powerpoint/2010/main" val="2791319770"/>
       </p:ext>
     </p:extLst>
   </p:cSld>

</xml_diff>